<commit_message>
tweaked slides as per AB comments
</commit_message>
<xml_diff>
--- a/Slides/Module 06 Concurrency Patterns in Typescript.pptx
+++ b/Slides/Module 06 Concurrency Patterns in Typescript.pptx
@@ -5,7 +5,7 @@
     <p:sldMasterId id="2147483703" r:id="rId1"/>
   </p:sldMasterIdLst>
   <p:notesMasterIdLst>
-    <p:notesMasterId r:id="rId40"/>
+    <p:notesMasterId r:id="rId39"/>
   </p:notesMasterIdLst>
   <p:sldIdLst>
     <p:sldId id="485" r:id="rId2"/>
@@ -33,19 +33,18 @@
     <p:sldId id="673" r:id="rId24"/>
     <p:sldId id="675" r:id="rId25"/>
     <p:sldId id="676" r:id="rId26"/>
-    <p:sldId id="683" r:id="rId27"/>
-    <p:sldId id="684" r:id="rId28"/>
-    <p:sldId id="628" r:id="rId29"/>
-    <p:sldId id="594" r:id="rId30"/>
-    <p:sldId id="560" r:id="rId31"/>
-    <p:sldId id="664" r:id="rId32"/>
-    <p:sldId id="629" r:id="rId33"/>
-    <p:sldId id="277" r:id="rId34"/>
-    <p:sldId id="544" r:id="rId35"/>
-    <p:sldId id="550" r:id="rId36"/>
-    <p:sldId id="499" r:id="rId37"/>
-    <p:sldId id="546" r:id="rId38"/>
-    <p:sldId id="604" r:id="rId39"/>
+    <p:sldId id="684" r:id="rId27"/>
+    <p:sldId id="628" r:id="rId28"/>
+    <p:sldId id="594" r:id="rId29"/>
+    <p:sldId id="560" r:id="rId30"/>
+    <p:sldId id="664" r:id="rId31"/>
+    <p:sldId id="629" r:id="rId32"/>
+    <p:sldId id="277" r:id="rId33"/>
+    <p:sldId id="544" r:id="rId34"/>
+    <p:sldId id="550" r:id="rId35"/>
+    <p:sldId id="499" r:id="rId36"/>
+    <p:sldId id="546" r:id="rId37"/>
+    <p:sldId id="604" r:id="rId38"/>
   </p:sldIdLst>
   <p:sldSz cx="12192000" cy="6858000"/>
   <p:notesSz cx="6858000" cy="9144000"/>
@@ -377,7 +376,6 @@
             <p14:sldId id="673"/>
             <p14:sldId id="675"/>
             <p14:sldId id="676"/>
-            <p14:sldId id="683"/>
             <p14:sldId id="684"/>
             <p14:sldId id="628"/>
             <p14:sldId id="594"/>
@@ -391,9 +389,6 @@
             <p14:sldId id="546"/>
             <p14:sldId id="604"/>
           </p14:sldIdLst>
-        </p14:section>
-        <p14:section name="Old Extras" id="{9A48D14A-4C03-4C14-9A04-AA72EA5B3E14}">
-          <p14:sldIdLst/>
         </p14:section>
       </p14:sectionLst>
     </p:ext>
@@ -725,6 +720,70 @@
           <a:p>
             <a:r>
               <a:rPr lang="en-US" dirty="0"/>
+              <a:t>run to completion means that if you start executing a task (or async) function then it must complete unless it awaits on something</a:t>
+            </a:r>
+          </a:p>
+        </p:txBody>
+      </p:sp>
+    </p:spTree>
+    <p:extLst>
+      <p:ext uri="{BB962C8B-B14F-4D97-AF65-F5344CB8AC3E}">
+        <p14:creationId xmlns:p14="http://schemas.microsoft.com/office/powerpoint/2010/main" val="2776060960"/>
+      </p:ext>
+    </p:extLst>
+  </p:cSld>
+  <p:clrMapOvr>
+    <a:masterClrMapping/>
+  </p:clrMapOvr>
+</p:notes>
+</file>
+
+<file path=ppt/notesSlides/notesSlide11.xml><?xml version="1.0" encoding="utf-8"?>
+<p:notes xmlns:a="http://schemas.openxmlformats.org/drawingml/2006/main" xmlns:r="http://schemas.openxmlformats.org/officeDocument/2006/relationships" xmlns:p="http://schemas.openxmlformats.org/presentationml/2006/main">
+  <p:cSld>
+    <p:spTree>
+      <p:nvGrpSpPr>
+        <p:cNvPr id="1" name=""/>
+        <p:cNvGrpSpPr/>
+        <p:nvPr/>
+      </p:nvGrpSpPr>
+      <p:grpSpPr>
+        <a:xfrm>
+          <a:off x="0" y="0"/>
+          <a:ext cx="0" cy="0"/>
+          <a:chOff x="0" y="0"/>
+          <a:chExt cx="0" cy="0"/>
+        </a:xfrm>
+      </p:grpSpPr>
+      <p:sp>
+        <p:nvSpPr>
+          <p:cNvPr id="2" name="Slide Image Placeholder 1"/>
+          <p:cNvSpPr>
+            <a:spLocks noGrp="1" noRot="1" noChangeAspect="1"/>
+          </p:cNvSpPr>
+          <p:nvPr>
+            <p:ph type="sldImg"/>
+          </p:nvPr>
+        </p:nvSpPr>
+        <p:spPr/>
+      </p:sp>
+      <p:sp>
+        <p:nvSpPr>
+          <p:cNvPr id="3" name="Notes Placeholder 2"/>
+          <p:cNvSpPr>
+            <a:spLocks noGrp="1"/>
+          </p:cNvSpPr>
+          <p:nvPr>
+            <p:ph type="body" idx="1"/>
+          </p:nvPr>
+        </p:nvSpPr>
+        <p:spPr/>
+        <p:txBody>
+          <a:bodyPr/>
+          <a:lstStyle/>
+          <a:p>
+            <a:r>
+              <a:rPr lang="en-US" dirty="0"/>
               <a:t>Review the code.  main() waits for the request to return, and then continues. </a:t>
             </a:r>
             <a:br>
@@ -747,7 +806,7 @@
 </p:notes>
 </file>
 
-<file path=ppt/notesSlides/notesSlide11.xml><?xml version="1.0" encoding="utf-8"?>
+<file path=ppt/notesSlides/notesSlide12.xml><?xml version="1.0" encoding="utf-8"?>
 <p:notes xmlns:a="http://schemas.openxmlformats.org/drawingml/2006/main" xmlns:r="http://schemas.openxmlformats.org/officeDocument/2006/relationships" xmlns:p="http://schemas.openxmlformats.org/presentationml/2006/main">
   <p:cSld>
     <p:spTree>
@@ -853,7 +912,7 @@
 </p:notes>
 </file>
 
-<file path=ppt/notesSlides/notesSlide12.xml><?xml version="1.0" encoding="utf-8"?>
+<file path=ppt/notesSlides/notesSlide13.xml><?xml version="1.0" encoding="utf-8"?>
 <p:notes xmlns:a="http://schemas.openxmlformats.org/drawingml/2006/main" xmlns:r="http://schemas.openxmlformats.org/officeDocument/2006/relationships" xmlns:p="http://schemas.openxmlformats.org/presentationml/2006/main">
   <p:cSld>
     <p:spTree>
@@ -965,7 +1024,7 @@
 </p:notes>
 </file>
 
-<file path=ppt/notesSlides/notesSlide13.xml><?xml version="1.0" encoding="utf-8"?>
+<file path=ppt/notesSlides/notesSlide14.xml><?xml version="1.0" encoding="utf-8"?>
 <p:notes xmlns:a="http://schemas.openxmlformats.org/drawingml/2006/main" xmlns:r="http://schemas.openxmlformats.org/officeDocument/2006/relationships" xmlns:p="http://schemas.openxmlformats.org/presentationml/2006/main">
   <p:cSld>
     <p:spTree>
@@ -1055,82 +1114,6 @@
 </p:notes>
 </file>
 
-<file path=ppt/notesSlides/notesSlide14.xml><?xml version="1.0" encoding="utf-8"?>
-<p:notes xmlns:a="http://schemas.openxmlformats.org/drawingml/2006/main" xmlns:r="http://schemas.openxmlformats.org/officeDocument/2006/relationships" xmlns:p="http://schemas.openxmlformats.org/presentationml/2006/main">
-  <p:cSld>
-    <p:spTree>
-      <p:nvGrpSpPr>
-        <p:cNvPr id="1" name=""/>
-        <p:cNvGrpSpPr/>
-        <p:nvPr/>
-      </p:nvGrpSpPr>
-      <p:grpSpPr>
-        <a:xfrm>
-          <a:off x="0" y="0"/>
-          <a:ext cx="0" cy="0"/>
-          <a:chOff x="0" y="0"/>
-          <a:chExt cx="0" cy="0"/>
-        </a:xfrm>
-      </p:grpSpPr>
-      <p:sp>
-        <p:nvSpPr>
-          <p:cNvPr id="2" name="Slide Image Placeholder 1"/>
-          <p:cNvSpPr>
-            <a:spLocks noGrp="1" noRot="1" noChangeAspect="1"/>
-          </p:cNvSpPr>
-          <p:nvPr>
-            <p:ph type="sldImg"/>
-          </p:nvPr>
-        </p:nvSpPr>
-        <p:spPr/>
-      </p:sp>
-      <p:sp>
-        <p:nvSpPr>
-          <p:cNvPr id="3" name="Notes Placeholder 2"/>
-          <p:cNvSpPr>
-            <a:spLocks noGrp="1"/>
-          </p:cNvSpPr>
-          <p:nvPr>
-            <p:ph type="body" idx="1"/>
-          </p:nvPr>
-        </p:nvSpPr>
-        <p:spPr/>
-        <p:txBody>
-          <a:bodyPr/>
-          <a:lstStyle/>
-          <a:p>
-            <a:r>
-              <a:rPr lang="en-US" dirty="0"/>
-              <a:t>We should leverage concurrency whenever possible. </a:t>
-            </a:r>
-          </a:p>
-          <a:p>
-            <a:endParaRPr lang="en-US" dirty="0"/>
-          </a:p>
-          <a:p>
-            <a:r>
-              <a:rPr lang="en-US" dirty="0"/>
-              <a:t>(Time is average of 100 runs on Prof. Wand’s Lenovo X1)</a:t>
-            </a:r>
-          </a:p>
-          <a:p>
-            <a:endParaRPr lang="en-US" dirty="0"/>
-          </a:p>
-        </p:txBody>
-      </p:sp>
-    </p:spTree>
-    <p:extLst>
-      <p:ext uri="{BB962C8B-B14F-4D97-AF65-F5344CB8AC3E}">
-        <p14:creationId xmlns:p14="http://schemas.microsoft.com/office/powerpoint/2010/main" val="3972934259"/>
-      </p:ext>
-    </p:extLst>
-  </p:cSld>
-  <p:clrMapOvr>
-    <a:masterClrMapping/>
-  </p:clrMapOvr>
-</p:notes>
-</file>
-
 <file path=ppt/notesSlides/notesSlide15.xml><?xml version="1.0" encoding="utf-8"?>
 <p:notes xmlns:a="http://schemas.openxmlformats.org/drawingml/2006/main" xmlns:r="http://schemas.openxmlformats.org/officeDocument/2006/relationships" xmlns:p="http://schemas.openxmlformats.org/presentationml/2006/main">
   <p:cSld>
@@ -1175,23 +1158,29 @@
           <a:bodyPr/>
           <a:lstStyle/>
           <a:p>
+            <a:r>
+              <a:rPr lang="en-US" dirty="0"/>
+              <a:t>We should leverage concurrency whenever possible. </a:t>
+            </a:r>
+          </a:p>
+          <a:p>
             <a:endParaRPr lang="en-US" dirty="0"/>
           </a:p>
           <a:p>
+            <a:r>
+              <a:rPr lang="en-US" dirty="0"/>
+              <a:t>(Time is average of 100 runs on Prof. Wand’s Lenovo X1)</a:t>
+            </a:r>
+          </a:p>
+          <a:p>
             <a:endParaRPr lang="en-US" dirty="0"/>
-          </a:p>
-          <a:p>
-            <a:r>
-              <a:rPr lang="en-US" dirty="0"/>
-              <a:t>In both cases, there is at most one active promise (in green) at any time!  But the concurrent version "masks latency with concurrency", as we said way back on slide 1.</a:t>
-            </a:r>
           </a:p>
         </p:txBody>
       </p:sp>
     </p:spTree>
     <p:extLst>
       <p:ext uri="{BB962C8B-B14F-4D97-AF65-F5344CB8AC3E}">
-        <p14:creationId xmlns:p14="http://schemas.microsoft.com/office/powerpoint/2010/main" val="502165979"/>
+        <p14:creationId xmlns:p14="http://schemas.microsoft.com/office/powerpoint/2010/main" val="3972934259"/>
       </p:ext>
     </p:extLst>
   </p:cSld>
@@ -1245,17 +1234,15 @@
           <a:bodyPr/>
           <a:lstStyle/>
           <a:p>
+            <a:endParaRPr lang="en-US" dirty="0"/>
+          </a:p>
+          <a:p>
+            <a:endParaRPr lang="en-US" dirty="0"/>
+          </a:p>
+          <a:p>
             <a:r>
               <a:rPr lang="en-US" dirty="0"/>
-              <a:t>In the examples so far, the arguments to the requests were independent of each other.  But there's no reason they have to be independent (except for </a:t>
-            </a:r>
-            <a:r>
-              <a:rPr lang="en-US" dirty="0" err="1"/>
-              <a:t>Promise.all</a:t>
-            </a:r>
-            <a:r>
-              <a:rPr lang="en-US" dirty="0"/>
-              <a:t>).  You can make them any way you need to.</a:t>
+              <a:t>In both cases, there is at most one active promise (in green) at any time!  But the concurrent version "masks latency with concurrency", as we said way back on slide 1.</a:t>
             </a:r>
           </a:p>
         </p:txBody>
@@ -1263,7 +1250,7 @@
     </p:spTree>
     <p:extLst>
       <p:ext uri="{BB962C8B-B14F-4D97-AF65-F5344CB8AC3E}">
-        <p14:creationId xmlns:p14="http://schemas.microsoft.com/office/powerpoint/2010/main" val="3561040700"/>
+        <p14:creationId xmlns:p14="http://schemas.microsoft.com/office/powerpoint/2010/main" val="502165979"/>
       </p:ext>
     </p:extLst>
   </p:cSld>
@@ -1318,20 +1305,16 @@
           <a:lstStyle/>
           <a:p>
             <a:r>
+              <a:rPr lang="en-US" dirty="0"/>
+              <a:t>In the examples so far, the arguments to the requests were independent of each other.  But there's no reason they have to be independent (except for </a:t>
+            </a:r>
+            <a:r>
               <a:rPr lang="en-US" dirty="0" err="1"/>
-              <a:t>asyncs</a:t>
+              <a:t>Promise.all</a:t>
             </a:r>
             <a:r>
               <a:rPr lang="en-US" dirty="0"/>
-              <a:t> play nicely with try/catch.   Here we've tweaked </a:t>
-            </a:r>
-            <a:r>
-              <a:rPr lang="en-US" dirty="0" err="1"/>
-              <a:t>fakeRequest</a:t>
-            </a:r>
-            <a:r>
-              <a:rPr lang="en-US" dirty="0"/>
-              <a:t> so that it will sometimes throw an error, and here's a wrapper that recovers from those errors (by returning 0).</a:t>
+              <a:t>).  You can make them any way you need to.</a:t>
             </a:r>
           </a:p>
         </p:txBody>
@@ -1339,7 +1322,7 @@
     </p:spTree>
     <p:extLst>
       <p:ext uri="{BB962C8B-B14F-4D97-AF65-F5344CB8AC3E}">
-        <p14:creationId xmlns:p14="http://schemas.microsoft.com/office/powerpoint/2010/main" val="2700302133"/>
+        <p14:creationId xmlns:p14="http://schemas.microsoft.com/office/powerpoint/2010/main" val="3561040700"/>
       </p:ext>
     </p:extLst>
   </p:cSld>
@@ -1394,6 +1377,82 @@
           <a:lstStyle/>
           <a:p>
             <a:r>
+              <a:rPr lang="en-US" dirty="0" err="1"/>
+              <a:t>asyncs</a:t>
+            </a:r>
+            <a:r>
+              <a:rPr lang="en-US" dirty="0"/>
+              <a:t> play nicely with try/catch.   Here we've tweaked </a:t>
+            </a:r>
+            <a:r>
+              <a:rPr lang="en-US" dirty="0" err="1"/>
+              <a:t>fakeRequest</a:t>
+            </a:r>
+            <a:r>
+              <a:rPr lang="en-US" dirty="0"/>
+              <a:t> so that it will sometimes throw an error, and here's a wrapper that recovers from those errors (by returning 0).</a:t>
+            </a:r>
+          </a:p>
+        </p:txBody>
+      </p:sp>
+    </p:spTree>
+    <p:extLst>
+      <p:ext uri="{BB962C8B-B14F-4D97-AF65-F5344CB8AC3E}">
+        <p14:creationId xmlns:p14="http://schemas.microsoft.com/office/powerpoint/2010/main" val="2700302133"/>
+      </p:ext>
+    </p:extLst>
+  </p:cSld>
+  <p:clrMapOvr>
+    <a:masterClrMapping/>
+  </p:clrMapOvr>
+</p:notes>
+</file>
+
+<file path=ppt/notesSlides/notesSlide19.xml><?xml version="1.0" encoding="utf-8"?>
+<p:notes xmlns:a="http://schemas.openxmlformats.org/drawingml/2006/main" xmlns:r="http://schemas.openxmlformats.org/officeDocument/2006/relationships" xmlns:p="http://schemas.openxmlformats.org/presentationml/2006/main">
+  <p:cSld>
+    <p:spTree>
+      <p:nvGrpSpPr>
+        <p:cNvPr id="1" name=""/>
+        <p:cNvGrpSpPr/>
+        <p:nvPr/>
+      </p:nvGrpSpPr>
+      <p:grpSpPr>
+        <a:xfrm>
+          <a:off x="0" y="0"/>
+          <a:ext cx="0" cy="0"/>
+          <a:chOff x="0" y="0"/>
+          <a:chExt cx="0" cy="0"/>
+        </a:xfrm>
+      </p:grpSpPr>
+      <p:sp>
+        <p:nvSpPr>
+          <p:cNvPr id="2" name="Slide Image Placeholder 1"/>
+          <p:cNvSpPr>
+            <a:spLocks noGrp="1" noRot="1" noChangeAspect="1"/>
+          </p:cNvSpPr>
+          <p:nvPr>
+            <p:ph type="sldImg"/>
+          </p:nvPr>
+        </p:nvSpPr>
+        <p:spPr/>
+      </p:sp>
+      <p:sp>
+        <p:nvSpPr>
+          <p:cNvPr id="3" name="Notes Placeholder 2"/>
+          <p:cNvSpPr>
+            <a:spLocks noGrp="1"/>
+          </p:cNvSpPr>
+          <p:nvPr>
+            <p:ph type="body" idx="1"/>
+          </p:nvPr>
+        </p:nvSpPr>
+        <p:spPr/>
+        <p:txBody>
+          <a:bodyPr/>
+          <a:lstStyle/>
+          <a:p>
+            <a:r>
               <a:rPr lang="en-US" dirty="0"/>
               <a:t>Let's change the subject.  How do you test an async function? To test an async function, make the second argument to ‘</a:t>
             </a:r>
@@ -1519,7 +1578,94 @@
 </p:notes>
 </file>
 
-<file path=ppt/notesSlides/notesSlide19.xml><?xml version="1.0" encoding="utf-8"?>
+<file path=ppt/notesSlides/notesSlide2.xml><?xml version="1.0" encoding="utf-8"?>
+<p:notes xmlns:a="http://schemas.openxmlformats.org/drawingml/2006/main" xmlns:r="http://schemas.openxmlformats.org/officeDocument/2006/relationships" xmlns:p="http://schemas.openxmlformats.org/presentationml/2006/main">
+  <p:cSld>
+    <p:spTree>
+      <p:nvGrpSpPr>
+        <p:cNvPr id="1" name=""/>
+        <p:cNvGrpSpPr/>
+        <p:nvPr/>
+      </p:nvGrpSpPr>
+      <p:grpSpPr>
+        <a:xfrm>
+          <a:off x="0" y="0"/>
+          <a:ext cx="0" cy="0"/>
+          <a:chOff x="0" y="0"/>
+          <a:chExt cx="0" cy="0"/>
+        </a:xfrm>
+      </p:grpSpPr>
+      <p:sp>
+        <p:nvSpPr>
+          <p:cNvPr id="2" name="Slide Image Placeholder 1"/>
+          <p:cNvSpPr>
+            <a:spLocks noGrp="1" noRot="1" noChangeAspect="1"/>
+          </p:cNvSpPr>
+          <p:nvPr>
+            <p:ph type="sldImg"/>
+          </p:nvPr>
+        </p:nvSpPr>
+        <p:spPr/>
+      </p:sp>
+      <p:sp>
+        <p:nvSpPr>
+          <p:cNvPr id="3" name="Notes Placeholder 2"/>
+          <p:cNvSpPr>
+            <a:spLocks noGrp="1"/>
+          </p:cNvSpPr>
+          <p:nvPr>
+            <p:ph type="body" idx="1"/>
+          </p:nvPr>
+        </p:nvSpPr>
+        <p:spPr/>
+        <p:txBody>
+          <a:bodyPr/>
+          <a:lstStyle/>
+          <a:p>
+            <a:r>
+              <a:rPr lang="en-US" dirty="0"/>
+              <a:t>&lt;read slide&gt;</a:t>
+            </a:r>
+          </a:p>
+        </p:txBody>
+      </p:sp>
+      <p:sp>
+        <p:nvSpPr>
+          <p:cNvPr id="4" name="Slide Number Placeholder 3"/>
+          <p:cNvSpPr>
+            <a:spLocks noGrp="1"/>
+          </p:cNvSpPr>
+          <p:nvPr>
+            <p:ph type="sldNum" sz="quarter" idx="5"/>
+          </p:nvPr>
+        </p:nvSpPr>
+        <p:spPr/>
+        <p:txBody>
+          <a:bodyPr/>
+          <a:lstStyle/>
+          <a:p>
+            <a:fld id="{07937F07-1250-4CCE-B198-1B2887014F41}" type="slidenum">
+              <a:rPr lang="en-US" smtClean="0"/>
+              <a:t>2</a:t>
+            </a:fld>
+            <a:endParaRPr lang="en-US"/>
+          </a:p>
+        </p:txBody>
+      </p:sp>
+    </p:spTree>
+    <p:extLst>
+      <p:ext uri="{BB962C8B-B14F-4D97-AF65-F5344CB8AC3E}">
+        <p14:creationId xmlns:p14="http://schemas.microsoft.com/office/powerpoint/2010/main" val="3748055252"/>
+      </p:ext>
+    </p:extLst>
+  </p:cSld>
+  <p:clrMapOvr>
+    <a:masterClrMapping/>
+  </p:clrMapOvr>
+</p:notes>
+</file>
+
+<file path=ppt/notesSlides/notesSlide20.xml><?xml version="1.0" encoding="utf-8"?>
 <p:notes xmlns:a="http://schemas.openxmlformats.org/drawingml/2006/main" xmlns:r="http://schemas.openxmlformats.org/officeDocument/2006/relationships" xmlns:p="http://schemas.openxmlformats.org/presentationml/2006/main">
   <p:cSld>
     <p:spTree>
@@ -1605,94 +1751,7 @@
 </p:notes>
 </file>
 
-<file path=ppt/notesSlides/notesSlide2.xml><?xml version="1.0" encoding="utf-8"?>
-<p:notes xmlns:a="http://schemas.openxmlformats.org/drawingml/2006/main" xmlns:r="http://schemas.openxmlformats.org/officeDocument/2006/relationships" xmlns:p="http://schemas.openxmlformats.org/presentationml/2006/main">
-  <p:cSld>
-    <p:spTree>
-      <p:nvGrpSpPr>
-        <p:cNvPr id="1" name=""/>
-        <p:cNvGrpSpPr/>
-        <p:nvPr/>
-      </p:nvGrpSpPr>
-      <p:grpSpPr>
-        <a:xfrm>
-          <a:off x="0" y="0"/>
-          <a:ext cx="0" cy="0"/>
-          <a:chOff x="0" y="0"/>
-          <a:chExt cx="0" cy="0"/>
-        </a:xfrm>
-      </p:grpSpPr>
-      <p:sp>
-        <p:nvSpPr>
-          <p:cNvPr id="2" name="Slide Image Placeholder 1"/>
-          <p:cNvSpPr>
-            <a:spLocks noGrp="1" noRot="1" noChangeAspect="1"/>
-          </p:cNvSpPr>
-          <p:nvPr>
-            <p:ph type="sldImg"/>
-          </p:nvPr>
-        </p:nvSpPr>
-        <p:spPr/>
-      </p:sp>
-      <p:sp>
-        <p:nvSpPr>
-          <p:cNvPr id="3" name="Notes Placeholder 2"/>
-          <p:cNvSpPr>
-            <a:spLocks noGrp="1"/>
-          </p:cNvSpPr>
-          <p:nvPr>
-            <p:ph type="body" idx="1"/>
-          </p:nvPr>
-        </p:nvSpPr>
-        <p:spPr/>
-        <p:txBody>
-          <a:bodyPr/>
-          <a:lstStyle/>
-          <a:p>
-            <a:r>
-              <a:rPr lang="en-US" dirty="0"/>
-              <a:t>&lt;read slide&gt;</a:t>
-            </a:r>
-          </a:p>
-        </p:txBody>
-      </p:sp>
-      <p:sp>
-        <p:nvSpPr>
-          <p:cNvPr id="4" name="Slide Number Placeholder 3"/>
-          <p:cNvSpPr>
-            <a:spLocks noGrp="1"/>
-          </p:cNvSpPr>
-          <p:nvPr>
-            <p:ph type="sldNum" sz="quarter" idx="5"/>
-          </p:nvPr>
-        </p:nvSpPr>
-        <p:spPr/>
-        <p:txBody>
-          <a:bodyPr/>
-          <a:lstStyle/>
-          <a:p>
-            <a:fld id="{07937F07-1250-4CCE-B198-1B2887014F41}" type="slidenum">
-              <a:rPr lang="en-US" smtClean="0"/>
-              <a:t>2</a:t>
-            </a:fld>
-            <a:endParaRPr lang="en-US"/>
-          </a:p>
-        </p:txBody>
-      </p:sp>
-    </p:spTree>
-    <p:extLst>
-      <p:ext uri="{BB962C8B-B14F-4D97-AF65-F5344CB8AC3E}">
-        <p14:creationId xmlns:p14="http://schemas.microsoft.com/office/powerpoint/2010/main" val="3748055252"/>
-      </p:ext>
-    </p:extLst>
-  </p:cSld>
-  <p:clrMapOvr>
-    <a:masterClrMapping/>
-  </p:clrMapOvr>
-</p:notes>
-</file>
-
-<file path=ppt/notesSlides/notesSlide20.xml><?xml version="1.0" encoding="utf-8"?>
+<file path=ppt/notesSlides/notesSlide21.xml><?xml version="1.0" encoding="utf-8"?>
 <p:notes xmlns:a="http://schemas.openxmlformats.org/drawingml/2006/main" xmlns:r="http://schemas.openxmlformats.org/officeDocument/2006/relationships" xmlns:p="http://schemas.openxmlformats.org/presentationml/2006/main">
   <p:cSld>
     <p:spTree>
@@ -1873,103 +1932,6 @@
 </p:notes>
 </file>
 
-<file path=ppt/notesSlides/notesSlide21.xml><?xml version="1.0" encoding="utf-8"?>
-<p:notes xmlns:a="http://schemas.openxmlformats.org/drawingml/2006/main" xmlns:r="http://schemas.openxmlformats.org/officeDocument/2006/relationships" xmlns:p="http://schemas.openxmlformats.org/presentationml/2006/main">
-  <p:cSld>
-    <p:spTree>
-      <p:nvGrpSpPr>
-        <p:cNvPr id="1" name=""/>
-        <p:cNvGrpSpPr/>
-        <p:nvPr/>
-      </p:nvGrpSpPr>
-      <p:grpSpPr>
-        <a:xfrm>
-          <a:off x="0" y="0"/>
-          <a:ext cx="0" cy="0"/>
-          <a:chOff x="0" y="0"/>
-          <a:chExt cx="0" cy="0"/>
-        </a:xfrm>
-      </p:grpSpPr>
-      <p:sp>
-        <p:nvSpPr>
-          <p:cNvPr id="2" name="Slide Image Placeholder 1"/>
-          <p:cNvSpPr>
-            <a:spLocks noGrp="1" noRot="1" noChangeAspect="1"/>
-          </p:cNvSpPr>
-          <p:nvPr>
-            <p:ph type="sldImg"/>
-          </p:nvPr>
-        </p:nvSpPr>
-        <p:spPr/>
-      </p:sp>
-      <p:sp>
-        <p:nvSpPr>
-          <p:cNvPr id="3" name="Notes Placeholder 2"/>
-          <p:cNvSpPr>
-            <a:spLocks noGrp="1"/>
-          </p:cNvSpPr>
-          <p:nvPr>
-            <p:ph type="body" idx="1"/>
-          </p:nvPr>
-        </p:nvSpPr>
-        <p:spPr/>
-        <p:txBody>
-          <a:bodyPr/>
-          <a:lstStyle/>
-          <a:p>
-            <a:r>
-              <a:rPr lang="en-US" dirty="0"/>
-              <a:t>This example also illustrates another </a:t>
-            </a:r>
-            <a:r>
-              <a:rPr lang="en-US" dirty="0" err="1"/>
-              <a:t>antiPattern</a:t>
-            </a:r>
-            <a:r>
-              <a:rPr lang="en-US" dirty="0"/>
-              <a:t>:  an async function with no await.  As it turns out, an async function with no await returns a promise to its returned value-- in this case, a promise that just returns </a:t>
-            </a:r>
-            <a:r>
-              <a:rPr lang="en-US" b="1" dirty="0"/>
-              <a:t>void. </a:t>
-            </a:r>
-            <a:r>
-              <a:rPr lang="en-US" b="0" dirty="0"/>
-              <a:t>If your function doesn't call any async function, then it shouldn't be an async.  If your function calls one or </a:t>
-            </a:r>
-            <a:r>
-              <a:rPr lang="en-US" b="0" dirty="0" err="1"/>
-              <a:t>asyncs</a:t>
-            </a:r>
-            <a:r>
-              <a:rPr lang="en-US" b="0" dirty="0"/>
-              <a:t>, then it should await them (either with await or await(</a:t>
-            </a:r>
-            <a:r>
-              <a:rPr lang="en-US" b="0" dirty="0" err="1"/>
-              <a:t>Promise.all</a:t>
-            </a:r>
-            <a:r>
-              <a:rPr lang="en-US" b="0" dirty="0"/>
-              <a:t>(…)) .)</a:t>
-            </a:r>
-            <a:endParaRPr lang="en-US" dirty="0"/>
-          </a:p>
-        </p:txBody>
-      </p:sp>
-    </p:spTree>
-    <p:extLst>
-      <p:ext uri="{BB962C8B-B14F-4D97-AF65-F5344CB8AC3E}">
-        <p14:creationId xmlns:p14="http://schemas.microsoft.com/office/powerpoint/2010/main" val="986658760"/>
-      </p:ext>
-    </p:extLst>
-  </p:cSld>
-  <p:clrMapOvr>
-    <a:masterClrMapping/>
-  </p:clrMapOvr>
-</p:notes>
-</file>
-
 <file path=ppt/notesSlides/notesSlide22.xml><?xml version="1.0" encoding="utf-8"?>
 <p:notes xmlns:a="http://schemas.openxmlformats.org/drawingml/2006/main" xmlns:r="http://schemas.openxmlformats.org/officeDocument/2006/relationships" xmlns:p="http://schemas.openxmlformats.org/presentationml/2006/main">
   <p:cSld>
@@ -3037,7 +2999,7 @@
           <a:p>
             <a:fld id="{07937F07-1250-4CCE-B198-1B2887014F41}" type="slidenum">
               <a:rPr lang="en-US" smtClean="0"/>
-              <a:t>38</a:t>
+              <a:t>37</a:t>
             </a:fld>
             <a:endParaRPr lang="en-US"/>
           </a:p>
@@ -3248,10 +3210,16 @@
           <a:p>
             <a:r>
               <a:rPr lang="en-US" dirty="0"/>
-              <a:t>By disallowing interrupts everywhere but at the pause points, we avoid almost all of the data races you may have learned about in your operating systems class.   Each grey box is a critical section, and your program consists of a set of critical sections.  Each green box is uninterruptible!!</a:t>
-            </a:r>
-          </a:p>
-          <a:p>
+              <a:t>Here's a typical async function.  It calls another async function, waits for that function to return, and then does something with the answer.  The "cooperative multiprocessing" means that while this function is waiting for the other function to return, the runtime can switch to some other task.  But there can be no interruptions while we are executing the code in </a:t>
+            </a:r>
+            <a:r>
+              <a:rPr lang="en-US" b="1" dirty="0"/>
+              <a:t>this</a:t>
+            </a:r>
+            <a:r>
+              <a:rPr lang="en-US" b="0" dirty="0"/>
+              <a:t> function.  Let's look at that idea in more detail.</a:t>
+            </a:r>
             <a:endParaRPr lang="en-US" dirty="0"/>
           </a:p>
         </p:txBody>
@@ -3259,7 +3227,7 @@
     </p:spTree>
     <p:extLst>
       <p:ext uri="{BB962C8B-B14F-4D97-AF65-F5344CB8AC3E}">
-        <p14:creationId xmlns:p14="http://schemas.microsoft.com/office/powerpoint/2010/main" val="3214472609"/>
+        <p14:creationId xmlns:p14="http://schemas.microsoft.com/office/powerpoint/2010/main" val="4008493160"/>
       </p:ext>
     </p:extLst>
   </p:cSld>
@@ -3314,69 +3282,9 @@
           <a:lstStyle/>
           <a:p>
             <a:r>
-              <a:rPr lang="en-US" b="0" dirty="0">
-                <a:solidFill>
-                  <a:srgbClr val="008000"/>
-                </a:solidFill>
-                <a:effectLst/>
-                <a:latin typeface="Consolas" panose="020B0609020204030204" pitchFamily="49" charset="0"/>
-              </a:rPr>
-              <a:t>In an interrupt-based model, it is possible that statement the print A runs *between* the print B and the print C.  Not for us!</a:t>
-            </a:r>
-          </a:p>
-          <a:p>
-            <a:endParaRPr lang="en-US" b="0" dirty="0">
-              <a:solidFill>
-                <a:srgbClr val="008000"/>
-              </a:solidFill>
-              <a:effectLst/>
-              <a:latin typeface="Consolas" panose="020B0609020204030204" pitchFamily="49" charset="0"/>
-            </a:endParaRPr>
-          </a:p>
-          <a:p>
-            <a:r>
-              <a:rPr lang="en-US" b="0" dirty="0">
-                <a:solidFill>
-                  <a:srgbClr val="008000"/>
-                </a:solidFill>
-                <a:effectLst/>
-                <a:latin typeface="Consolas" panose="020B0609020204030204" pitchFamily="49" charset="0"/>
-              </a:rPr>
-              <a:t>(Don't worry about the details of the run() procedure-- we'll explain that soon).</a:t>
-            </a:r>
-          </a:p>
-          <a:p>
-            <a:endParaRPr lang="en-US" dirty="0"/>
-          </a:p>
-          <a:p>
-            <a:endParaRPr lang="en-US" b="0" dirty="0">
-              <a:solidFill>
-                <a:srgbClr val="000000"/>
-              </a:solidFill>
-              <a:effectLst/>
-              <a:latin typeface="Consolas" panose="020B0609020204030204" pitchFamily="49" charset="0"/>
-            </a:endParaRPr>
-          </a:p>
-          <a:p>
-            <a:br>
-              <a:rPr lang="en-US" b="0" dirty="0">
-                <a:solidFill>
-                  <a:srgbClr val="000000"/>
-                </a:solidFill>
-                <a:effectLst/>
-                <a:latin typeface="Consolas" panose="020B0609020204030204" pitchFamily="49" charset="0"/>
-              </a:rPr>
-            </a:br>
-            <a:endParaRPr lang="en-US" b="0" dirty="0">
-              <a:solidFill>
-                <a:srgbClr val="000000"/>
-              </a:solidFill>
-              <a:effectLst/>
-              <a:latin typeface="Consolas" panose="020B0609020204030204" pitchFamily="49" charset="0"/>
-            </a:endParaRPr>
-          </a:p>
-          <a:p>
-            <a:endParaRPr lang="en-US" dirty="0"/>
+              <a:rPr lang="en-US" dirty="0"/>
+              <a:t>By disallowing interrupts everywhere but at the pause points, we avoid almost all of the data races you may have learned about in your operating systems class.   Each grey box is a critical section, and your program consists of a set of critical sections.  Each green box is uninterruptible!!</a:t>
+            </a:r>
           </a:p>
           <a:p>
             <a:endParaRPr lang="en-US" dirty="0"/>
@@ -3386,7 +3294,7 @@
     </p:spTree>
     <p:extLst>
       <p:ext uri="{BB962C8B-B14F-4D97-AF65-F5344CB8AC3E}">
-        <p14:creationId xmlns:p14="http://schemas.microsoft.com/office/powerpoint/2010/main" val="3282751170"/>
+        <p14:creationId xmlns:p14="http://schemas.microsoft.com/office/powerpoint/2010/main" val="3214472609"/>
       </p:ext>
     </p:extLst>
   </p:cSld>
@@ -3441,90 +3349,79 @@
           <a:lstStyle/>
           <a:p>
             <a:r>
-              <a:rPr lang="en-US" dirty="0"/>
-              <a:t>An async function yields or pauses in exactly two places in its code.  What happens at those places?</a:t>
+              <a:rPr lang="en-US" b="0" dirty="0">
+                <a:solidFill>
+                  <a:srgbClr val="008000"/>
+                </a:solidFill>
+                <a:effectLst/>
+                <a:latin typeface="Consolas" panose="020B0609020204030204" pitchFamily="49" charset="0"/>
+              </a:rPr>
+              <a:t>In an interrupt-based model, it is possible that statement the print A runs *between* the print B and the print C.  Not for us!</a:t>
+            </a:r>
+          </a:p>
+          <a:p>
+            <a:endParaRPr lang="en-US" b="0" dirty="0">
+              <a:solidFill>
+                <a:srgbClr val="008000"/>
+              </a:solidFill>
+              <a:effectLst/>
+              <a:latin typeface="Consolas" panose="020B0609020204030204" pitchFamily="49" charset="0"/>
+            </a:endParaRPr>
+          </a:p>
+          <a:p>
+            <a:r>
+              <a:rPr lang="en-US" b="0" dirty="0">
+                <a:solidFill>
+                  <a:srgbClr val="008000"/>
+                </a:solidFill>
+                <a:effectLst/>
+                <a:latin typeface="Consolas" panose="020B0609020204030204" pitchFamily="49" charset="0"/>
+              </a:rPr>
+              <a:t>(Don't worry about the details of the run() procedure-- we'll explain that soon).</a:t>
             </a:r>
           </a:p>
           <a:p>
             <a:endParaRPr lang="en-US" dirty="0"/>
           </a:p>
           <a:p>
-            <a:r>
-              <a:rPr lang="en-US" dirty="0"/>
-              <a:t>When </a:t>
-            </a:r>
-            <a:r>
-              <a:rPr lang="en-US" dirty="0" err="1"/>
-              <a:t>someFunction</a:t>
-            </a:r>
-            <a:r>
-              <a:rPr lang="en-US" dirty="0"/>
-              <a:t> yields at the first location, it informs the runtime that </a:t>
-            </a:r>
-            <a:r>
-              <a:rPr lang="en-US" dirty="0" err="1"/>
-              <a:t>someOtherAsyncFunction</a:t>
-            </a:r>
-            <a:r>
-              <a:rPr lang="en-US" dirty="0"/>
-              <a:t>(j) is ready to run, and that </a:t>
-            </a:r>
-            <a:r>
-              <a:rPr lang="en-US" dirty="0" err="1"/>
-              <a:t>someFunction</a:t>
-            </a:r>
-            <a:r>
-              <a:rPr lang="en-US" dirty="0"/>
-              <a:t> will be ready to resume its execution only when </a:t>
-            </a:r>
-            <a:r>
-              <a:rPr lang="en-US" dirty="0" err="1"/>
-              <a:t>someOtherAsyncFunction</a:t>
-            </a:r>
-            <a:r>
-              <a:rPr lang="en-US" dirty="0"/>
-              <a:t>(j) returns a value.  The runtime can then switch to any process that is ready.  That might be the call to </a:t>
-            </a:r>
-            <a:r>
-              <a:rPr lang="en-US" dirty="0" err="1"/>
-              <a:t>someOtherAsync</a:t>
-            </a:r>
-            <a:r>
-              <a:rPr lang="en-US" dirty="0"/>
-              <a:t> function, but it might be something else.</a:t>
-            </a:r>
+            <a:endParaRPr lang="en-US" b="0" dirty="0">
+              <a:solidFill>
+                <a:srgbClr val="000000"/>
+              </a:solidFill>
+              <a:effectLst/>
+              <a:latin typeface="Consolas" panose="020B0609020204030204" pitchFamily="49" charset="0"/>
+            </a:endParaRPr>
+          </a:p>
+          <a:p>
+            <a:br>
+              <a:rPr lang="en-US" b="0" dirty="0">
+                <a:solidFill>
+                  <a:srgbClr val="000000"/>
+                </a:solidFill>
+                <a:effectLst/>
+                <a:latin typeface="Consolas" panose="020B0609020204030204" pitchFamily="49" charset="0"/>
+              </a:rPr>
+            </a:br>
+            <a:endParaRPr lang="en-US" b="0" dirty="0">
+              <a:solidFill>
+                <a:srgbClr val="000000"/>
+              </a:solidFill>
+              <a:effectLst/>
+              <a:latin typeface="Consolas" panose="020B0609020204030204" pitchFamily="49" charset="0"/>
+            </a:endParaRPr>
           </a:p>
           <a:p>
             <a:endParaRPr lang="en-US" dirty="0"/>
           </a:p>
           <a:p>
-            <a:r>
-              <a:rPr lang="en-US" dirty="0"/>
-              <a:t>When </a:t>
-            </a:r>
-            <a:r>
-              <a:rPr lang="en-US" dirty="0" err="1"/>
-              <a:t>someFunction</a:t>
-            </a:r>
-            <a:r>
-              <a:rPr lang="en-US" dirty="0"/>
-              <a:t> yields at the second location, it informs the runtime that it is ready to return to its caller, and it gives the runtime permission to switch to any process that is ready.  It might be the caller of </a:t>
-            </a:r>
-            <a:r>
-              <a:rPr lang="en-US" dirty="0" err="1"/>
-              <a:t>someFunction</a:t>
-            </a:r>
-            <a:r>
-              <a:rPr lang="en-US" dirty="0"/>
-              <a:t>, or it might be something else.</a:t>
-            </a:r>
+            <a:endParaRPr lang="en-US" dirty="0"/>
           </a:p>
         </p:txBody>
       </p:sp>
     </p:spTree>
     <p:extLst>
       <p:ext uri="{BB962C8B-B14F-4D97-AF65-F5344CB8AC3E}">
-        <p14:creationId xmlns:p14="http://schemas.microsoft.com/office/powerpoint/2010/main" val="1748066163"/>
+        <p14:creationId xmlns:p14="http://schemas.microsoft.com/office/powerpoint/2010/main" val="3282751170"/>
       </p:ext>
     </p:extLst>
   </p:cSld>
@@ -3580,7 +3477,81 @@
           <a:p>
             <a:r>
               <a:rPr lang="en-US" dirty="0"/>
-              <a:t>run to completion means that if you start executing a task (or async) function then it must complete unless it awaits on something</a:t>
+              <a:t>An async function yields or pauses in exactly two places in its code.  What happens at those places?</a:t>
+            </a:r>
+          </a:p>
+          <a:p>
+            <a:endParaRPr lang="en-US" dirty="0"/>
+          </a:p>
+          <a:p>
+            <a:r>
+              <a:rPr lang="en-US" dirty="0"/>
+              <a:t>When </a:t>
+            </a:r>
+            <a:r>
+              <a:rPr lang="en-US" dirty="0" err="1"/>
+              <a:t>someFunction</a:t>
+            </a:r>
+            <a:r>
+              <a:rPr lang="en-US" dirty="0"/>
+              <a:t> yields at the first location, it informs the runtime that </a:t>
+            </a:r>
+            <a:r>
+              <a:rPr lang="en-US" dirty="0" err="1"/>
+              <a:t>someOtherAsyncFunction</a:t>
+            </a:r>
+            <a:r>
+              <a:rPr lang="en-US" dirty="0"/>
+              <a:t>(j) is ready to run, and that </a:t>
+            </a:r>
+            <a:r>
+              <a:rPr lang="en-US" dirty="0" err="1"/>
+              <a:t>someFunction</a:t>
+            </a:r>
+            <a:r>
+              <a:rPr lang="en-US" dirty="0"/>
+              <a:t> will be ready to resume its execution only when </a:t>
+            </a:r>
+            <a:r>
+              <a:rPr lang="en-US" dirty="0" err="1"/>
+              <a:t>someOtherAsyncFunction</a:t>
+            </a:r>
+            <a:r>
+              <a:rPr lang="en-US" dirty="0"/>
+              <a:t>(j) returns a value.  The runtime can then switch to any process that is ready.  That might be the call to </a:t>
+            </a:r>
+            <a:r>
+              <a:rPr lang="en-US" dirty="0" err="1"/>
+              <a:t>someOtherAsync</a:t>
+            </a:r>
+            <a:r>
+              <a:rPr lang="en-US" dirty="0"/>
+              <a:t> function, but it might be something else.</a:t>
+            </a:r>
+          </a:p>
+          <a:p>
+            <a:endParaRPr lang="en-US" dirty="0"/>
+          </a:p>
+          <a:p>
+            <a:r>
+              <a:rPr lang="en-US" dirty="0"/>
+              <a:t>When </a:t>
+            </a:r>
+            <a:r>
+              <a:rPr lang="en-US" dirty="0" err="1"/>
+              <a:t>someFunction</a:t>
+            </a:r>
+            <a:r>
+              <a:rPr lang="en-US" dirty="0"/>
+              <a:t> yields at the second location, it informs the runtime that it is ready to return to its caller, and it gives the runtime permission to switch to any process that is ready.  It might be the caller of </a:t>
+            </a:r>
+            <a:r>
+              <a:rPr lang="en-US" dirty="0" err="1"/>
+              <a:t>someFunction</a:t>
+            </a:r>
+            <a:r>
+              <a:rPr lang="en-US" dirty="0"/>
+              <a:t>, or it might be something else.</a:t>
             </a:r>
           </a:p>
         </p:txBody>
@@ -3588,7 +3559,7 @@
     </p:spTree>
     <p:extLst>
       <p:ext uri="{BB962C8B-B14F-4D97-AF65-F5344CB8AC3E}">
-        <p14:creationId xmlns:p14="http://schemas.microsoft.com/office/powerpoint/2010/main" val="2776060960"/>
+        <p14:creationId xmlns:p14="http://schemas.microsoft.com/office/powerpoint/2010/main" val="1748066163"/>
       </p:ext>
     </p:extLst>
   </p:cSld>
@@ -3801,7 +3772,7 @@
                 <a:tabLst/>
                 <a:defRPr/>
               </a:pPr>
-              <a:t>9/15/2025</a:t>
+              <a:t>9/17/2025</a:t>
             </a:fld>
             <a:endParaRPr kumimoji="0" lang="en-US" sz="1200" b="0" i="0" u="none" strike="noStrike" kern="1200" cap="none" spc="0" normalizeH="0" baseline="0" noProof="0">
               <a:ln>
@@ -4285,7 +4256,7 @@
                 <a:tabLst/>
                 <a:defRPr/>
               </a:pPr>
-              <a:t>9/15/2025</a:t>
+              <a:t>9/17/2025</a:t>
             </a:fld>
             <a:endParaRPr kumimoji="0" lang="en-US" sz="1200" b="0" i="0" u="none" strike="noStrike" kern="1200" cap="none" spc="0" normalizeH="0" baseline="0" noProof="0">
               <a:ln>
@@ -4643,7 +4614,7 @@
                 <a:tabLst/>
                 <a:defRPr/>
               </a:pPr>
-              <a:t>9/15/2025</a:t>
+              <a:t>9/17/2025</a:t>
             </a:fld>
             <a:endParaRPr kumimoji="0" lang="en-US" sz="1200" b="0" i="0" u="none" strike="noStrike" kern="1200" cap="none" spc="0" normalizeH="0" baseline="0" noProof="0">
               <a:ln>
@@ -5011,7 +4982,7 @@
                 <a:tabLst/>
                 <a:defRPr/>
               </a:pPr>
-              <a:t>9/15/2025</a:t>
+              <a:t>9/17/2025</a:t>
             </a:fld>
             <a:endParaRPr kumimoji="0" lang="en-US" sz="1200" b="0" i="0" u="none" strike="noStrike" kern="1200" cap="none" spc="0" normalizeH="0" baseline="0" noProof="0">
               <a:ln>
@@ -5981,7 +5952,7 @@
                 <a:tabLst/>
                 <a:defRPr/>
               </a:pPr>
-              <a:t>9/15/2025</a:t>
+              <a:t>9/17/2025</a:t>
             </a:fld>
             <a:endParaRPr kumimoji="0" lang="en-US" sz="1200" b="0" i="0" u="none" strike="noStrike" kern="1200" cap="none" spc="0" normalizeH="0" baseline="0" noProof="0">
               <a:ln>
@@ -6407,7 +6378,7 @@
                 <a:tabLst/>
                 <a:defRPr/>
               </a:pPr>
-              <a:t>9/15/2025</a:t>
+              <a:t>9/17/2025</a:t>
             </a:fld>
             <a:endParaRPr kumimoji="0" lang="en-US" sz="1200" b="0" i="0" u="none" strike="noStrike" kern="1200" cap="none" spc="0" normalizeH="0" baseline="0" noProof="0">
               <a:ln>
@@ -6771,7 +6742,7 @@
                 <a:tabLst/>
                 <a:defRPr/>
               </a:pPr>
-              <a:t>9/15/2025</a:t>
+              <a:t>9/17/2025</a:t>
             </a:fld>
             <a:endParaRPr kumimoji="0" lang="en-US" sz="1200" b="0" i="0" u="none" strike="noStrike" kern="1200" cap="none" spc="0" normalizeH="0" baseline="0" noProof="0">
               <a:ln>
@@ -7298,7 +7269,7 @@
                 <a:tabLst/>
                 <a:defRPr/>
               </a:pPr>
-              <a:t>9/15/2025</a:t>
+              <a:t>9/17/2025</a:t>
             </a:fld>
             <a:endParaRPr kumimoji="0" lang="en-US" sz="1200" b="0" i="0" u="none" strike="noStrike" kern="1200" cap="none" spc="0" normalizeH="0" baseline="0" noProof="0">
               <a:ln>
@@ -7759,7 +7730,7 @@
                 <a:tabLst/>
                 <a:defRPr/>
               </a:pPr>
-              <a:t>9/15/2025</a:t>
+              <a:t>9/17/2025</a:t>
             </a:fld>
             <a:endParaRPr kumimoji="0" lang="en-US" sz="1200" b="0" i="0" u="none" strike="noStrike" kern="1200" cap="none" spc="0" normalizeH="0" baseline="0" noProof="0">
               <a:ln>
@@ -8367,7 +8338,7 @@
                 <a:tabLst/>
                 <a:defRPr/>
               </a:pPr>
-              <a:t>9/15/2025</a:t>
+              <a:t>9/17/2025</a:t>
             </a:fld>
             <a:endParaRPr kumimoji="0" lang="en-US" sz="1200" b="0" i="0" u="none" strike="noStrike" kern="1200" cap="none" spc="0" normalizeH="0" baseline="0" noProof="0">
               <a:ln>
@@ -8640,7 +8611,7 @@
                 <a:tabLst/>
                 <a:defRPr/>
               </a:pPr>
-              <a:t>9/15/2025</a:t>
+              <a:t>9/17/2025</a:t>
             </a:fld>
             <a:endParaRPr kumimoji="0" lang="en-US" sz="1200" b="0" i="0" u="none" strike="noStrike" kern="1200" cap="none" spc="0" normalizeH="0" baseline="0" noProof="0">
               <a:ln>
@@ -9111,7 +9082,7 @@
                 <a:tabLst/>
                 <a:defRPr/>
               </a:pPr>
-              <a:t>9/15/2025</a:t>
+              <a:t>9/17/2025</a:t>
             </a:fld>
             <a:endParaRPr kumimoji="0" lang="en-US" sz="1200" b="0" i="0" u="none" strike="noStrike" kern="1200" cap="none" spc="0" normalizeH="0" baseline="0" noProof="0">
               <a:ln>
@@ -9512,7 +9483,7 @@
                 <a:tabLst/>
                 <a:defRPr/>
               </a:pPr>
-              <a:t>9/15/2025</a:t>
+              <a:t>9/17/2025</a:t>
             </a:fld>
             <a:endParaRPr kumimoji="0" lang="en-US" sz="1200" b="0" i="0" u="none" strike="noStrike" kern="1200" cap="none" spc="0" normalizeH="0" baseline="0" noProof="0">
               <a:ln>
@@ -26639,7 +26610,7 @@
           <p:cNvPr id="2" name="Title 1">
             <a:extLst>
               <a:ext uri="{FF2B5EF4-FFF2-40B4-BE49-F238E27FC236}">
-                <a16:creationId xmlns:a16="http://schemas.microsoft.com/office/drawing/2014/main" id="{C95143EA-9B8C-0797-2510-7BC626EACB21}"/>
+                <a16:creationId xmlns:a16="http://schemas.microsoft.com/office/drawing/2014/main" id="{7E3C3C71-F774-1710-A3D1-D12E7FEC9D88}"/>
               </a:ext>
             </a:extLst>
           </p:cNvPr>
@@ -26656,781 +26627,17 @@
           <a:lstStyle/>
           <a:p>
             <a:r>
+              <a:rPr lang="en-US" dirty="0" err="1"/>
+              <a:t>AntiPattern</a:t>
+            </a:r>
+            <a:r>
               <a:rPr lang="en-US" dirty="0"/>
-              <a:t>AntiPattern1a: async with no await</a:t>
-            </a:r>
-          </a:p>
-        </p:txBody>
-      </p:sp>
-      <p:sp>
-        <p:nvSpPr>
-          <p:cNvPr id="3" name="Content Placeholder 2">
-            <a:extLst>
-              <a:ext uri="{FF2B5EF4-FFF2-40B4-BE49-F238E27FC236}">
-                <a16:creationId xmlns:a16="http://schemas.microsoft.com/office/drawing/2014/main" id="{28D56449-1DCF-3FDB-310F-6893AA37A752}"/>
-              </a:ext>
-            </a:extLst>
-          </p:cNvPr>
-          <p:cNvSpPr>
-            <a:spLocks noGrp="1"/>
-          </p:cNvSpPr>
-          <p:nvPr>
-            <p:ph idx="1"/>
-          </p:nvPr>
-        </p:nvSpPr>
-        <p:spPr>
-          <a:xfrm>
-            <a:off x="838199" y="1500160"/>
-            <a:ext cx="9871841" cy="4351338"/>
-          </a:xfrm>
-        </p:spPr>
-        <p:txBody>
-          <a:bodyPr/>
-          <a:lstStyle/>
-          <a:p>
-            <a:pPr marL="0" marR="0" lvl="0" indent="0" algn="l" defTabSz="1219169" rtl="0" eaLnBrk="1" fontAlgn="auto" latinLnBrk="0" hangingPunct="0">
-              <a:lnSpc>
-                <a:spcPct val="100000"/>
-              </a:lnSpc>
-              <a:spcBef>
-                <a:spcPts val="0"/>
-              </a:spcBef>
-              <a:spcAft>
-                <a:spcPts val="0"/>
-              </a:spcAft>
-              <a:buClrTx/>
-              <a:buSzTx/>
-              <a:buFontTx/>
-              <a:buNone/>
-              <a:tabLst/>
-              <a:defRPr/>
-            </a:pPr>
-            <a:r>
-              <a:rPr kumimoji="0" lang="en-US" sz="2000" b="0" i="0" u="none" strike="noStrike" kern="0" cap="none" spc="0" normalizeH="0" baseline="0" noProof="0" dirty="0">
-                <a:ln>
-                  <a:noFill/>
-                </a:ln>
-                <a:solidFill>
-                  <a:srgbClr val="0000FF"/>
-                </a:solidFill>
-                <a:effectLst/>
-                <a:uLnTx/>
-                <a:uFillTx/>
-                <a:latin typeface="Consolas" panose="020B0609020204030204" pitchFamily="49" charset="0"/>
-                <a:ea typeface="+mn-ea"/>
-                <a:cs typeface="+mn-cs"/>
-                <a:sym typeface="Helvetica Neue"/>
-              </a:rPr>
-              <a:t>async</a:t>
-            </a:r>
-            <a:r>
-              <a:rPr kumimoji="0" lang="en-US" sz="2000" b="0" i="0" u="none" strike="noStrike" kern="0" cap="none" spc="0" normalizeH="0" baseline="0" noProof="0" dirty="0">
-                <a:ln>
-                  <a:noFill/>
-                </a:ln>
-                <a:solidFill>
-                  <a:srgbClr val="000000"/>
-                </a:solidFill>
-                <a:effectLst/>
-                <a:uLnTx/>
-                <a:uFillTx/>
-                <a:latin typeface="Consolas" panose="020B0609020204030204" pitchFamily="49" charset="0"/>
-                <a:ea typeface="+mn-ea"/>
-                <a:cs typeface="+mn-cs"/>
-                <a:sym typeface="Helvetica Neue"/>
-              </a:rPr>
-              <a:t> </a:t>
-            </a:r>
-            <a:r>
-              <a:rPr kumimoji="0" lang="en-US" sz="2000" b="0" i="0" u="none" strike="noStrike" kern="0" cap="none" spc="0" normalizeH="0" baseline="0" noProof="0" dirty="0">
-                <a:ln>
-                  <a:noFill/>
-                </a:ln>
-                <a:solidFill>
-                  <a:srgbClr val="0000FF"/>
-                </a:solidFill>
-                <a:effectLst/>
-                <a:uLnTx/>
-                <a:uFillTx/>
-                <a:latin typeface="Consolas" panose="020B0609020204030204" pitchFamily="49" charset="0"/>
-                <a:ea typeface="+mn-ea"/>
-                <a:cs typeface="+mn-cs"/>
-                <a:sym typeface="Helvetica Neue"/>
-              </a:rPr>
-              <a:t>function</a:t>
-            </a:r>
-            <a:r>
-              <a:rPr kumimoji="0" lang="en-US" sz="2000" b="0" i="0" u="none" strike="noStrike" kern="0" cap="none" spc="0" normalizeH="0" baseline="0" noProof="0" dirty="0">
-                <a:ln>
-                  <a:noFill/>
-                </a:ln>
-                <a:solidFill>
-                  <a:srgbClr val="000000"/>
-                </a:solidFill>
-                <a:effectLst/>
-                <a:uLnTx/>
-                <a:uFillTx/>
-                <a:latin typeface="Consolas" panose="020B0609020204030204" pitchFamily="49" charset="0"/>
-                <a:ea typeface="+mn-ea"/>
-                <a:cs typeface="+mn-cs"/>
-                <a:sym typeface="Helvetica Neue"/>
-              </a:rPr>
-              <a:t> main() {</a:t>
-            </a:r>
-          </a:p>
-          <a:p>
-            <a:pPr marL="0" marR="0" lvl="0" indent="0" algn="l" defTabSz="1219169" rtl="0" eaLnBrk="1" fontAlgn="auto" latinLnBrk="0" hangingPunct="0">
-              <a:lnSpc>
-                <a:spcPct val="100000"/>
-              </a:lnSpc>
-              <a:spcBef>
-                <a:spcPts val="0"/>
-              </a:spcBef>
-              <a:spcAft>
-                <a:spcPts val="0"/>
-              </a:spcAft>
-              <a:buClrTx/>
-              <a:buSzTx/>
-              <a:buFontTx/>
-              <a:buNone/>
-              <a:tabLst/>
-              <a:defRPr/>
-            </a:pPr>
-            <a:r>
-              <a:rPr kumimoji="0" lang="en-US" sz="2000" b="0" i="0" u="none" strike="noStrike" kern="0" cap="none" spc="0" normalizeH="0" baseline="0" noProof="0" dirty="0">
-                <a:ln>
-                  <a:noFill/>
-                </a:ln>
-                <a:solidFill>
-                  <a:srgbClr val="000000"/>
-                </a:solidFill>
-                <a:effectLst/>
-                <a:uLnTx/>
-                <a:uFillTx/>
-                <a:latin typeface="Consolas" panose="020B0609020204030204" pitchFamily="49" charset="0"/>
-                <a:ea typeface="+mn-ea"/>
-                <a:cs typeface="+mn-cs"/>
-                <a:sym typeface="Helvetica Neue"/>
-              </a:rPr>
-              <a:t>    console.log(</a:t>
-            </a:r>
-            <a:r>
-              <a:rPr kumimoji="0" lang="en-US" sz="2000" b="0" i="0" u="none" strike="noStrike" kern="0" cap="none" spc="0" normalizeH="0" baseline="0" noProof="0" dirty="0">
-                <a:ln>
-                  <a:noFill/>
-                </a:ln>
-                <a:solidFill>
-                  <a:srgbClr val="A31515"/>
-                </a:solidFill>
-                <a:effectLst/>
-                <a:uLnTx/>
-                <a:uFillTx/>
-                <a:latin typeface="Consolas" panose="020B0609020204030204" pitchFamily="49" charset="0"/>
-                <a:ea typeface="+mn-ea"/>
-                <a:cs typeface="+mn-cs"/>
-                <a:sym typeface="Helvetica Neue"/>
-              </a:rPr>
-              <a:t>'main started'</a:t>
-            </a:r>
-            <a:r>
-              <a:rPr kumimoji="0" lang="en-US" sz="2000" b="0" i="0" u="none" strike="noStrike" kern="0" cap="none" spc="0" normalizeH="0" baseline="0" noProof="0" dirty="0">
-                <a:ln>
-                  <a:noFill/>
-                </a:ln>
-                <a:solidFill>
-                  <a:srgbClr val="000000"/>
-                </a:solidFill>
-                <a:effectLst/>
-                <a:uLnTx/>
-                <a:uFillTx/>
-                <a:latin typeface="Consolas" panose="020B0609020204030204" pitchFamily="49" charset="0"/>
-                <a:ea typeface="+mn-ea"/>
-                <a:cs typeface="+mn-cs"/>
-                <a:sym typeface="Helvetica Neue"/>
-              </a:rPr>
-              <a:t>);</a:t>
-            </a:r>
-          </a:p>
-          <a:p>
-            <a:pPr marL="0" marR="0" lvl="0" indent="0" algn="l" defTabSz="1219169" rtl="0" eaLnBrk="1" fontAlgn="auto" latinLnBrk="0" hangingPunct="0">
-              <a:lnSpc>
-                <a:spcPct val="100000"/>
-              </a:lnSpc>
-              <a:spcBef>
-                <a:spcPts val="0"/>
-              </a:spcBef>
-              <a:spcAft>
-                <a:spcPts val="0"/>
-              </a:spcAft>
-              <a:buClrTx/>
-              <a:buSzTx/>
-              <a:buFontTx/>
-              <a:buNone/>
-              <a:tabLst/>
-              <a:defRPr/>
-            </a:pPr>
-            <a:r>
-              <a:rPr kumimoji="0" lang="en-US" sz="2000" b="0" i="0" u="none" strike="noStrike" kern="0" cap="none" spc="0" normalizeH="0" baseline="0" noProof="0" dirty="0">
-                <a:ln>
-                  <a:noFill/>
-                </a:ln>
-                <a:solidFill>
-                  <a:srgbClr val="000000"/>
-                </a:solidFill>
-                <a:effectLst/>
-                <a:uLnTx/>
-                <a:uFillTx/>
-                <a:latin typeface="Consolas" panose="020B0609020204030204" pitchFamily="49" charset="0"/>
-                <a:ea typeface="+mn-ea"/>
-                <a:cs typeface="+mn-cs"/>
-                <a:sym typeface="Helvetica Neue"/>
-              </a:rPr>
-              <a:t>    </a:t>
-            </a:r>
-            <a:r>
-              <a:rPr kumimoji="0" lang="en-US" sz="2000" b="0" i="0" u="none" strike="noStrike" kern="0" cap="none" spc="0" normalizeH="0" baseline="0" noProof="0" dirty="0">
-                <a:ln>
-                  <a:noFill/>
-                </a:ln>
-                <a:solidFill>
-                  <a:srgbClr val="0000FF"/>
-                </a:solidFill>
-                <a:effectLst/>
-                <a:uLnTx/>
-                <a:uFillTx/>
-                <a:latin typeface="Consolas" panose="020B0609020204030204" pitchFamily="49" charset="0"/>
-                <a:ea typeface="+mn-ea"/>
-                <a:cs typeface="+mn-cs"/>
-                <a:sym typeface="Helvetica Neue"/>
-              </a:rPr>
-              <a:t>const</a:t>
-            </a:r>
-            <a:r>
-              <a:rPr kumimoji="0" lang="en-US" sz="2000" b="0" i="0" u="none" strike="noStrike" kern="0" cap="none" spc="0" normalizeH="0" baseline="0" noProof="0" dirty="0">
-                <a:ln>
-                  <a:noFill/>
-                </a:ln>
-                <a:solidFill>
-                  <a:srgbClr val="000000"/>
-                </a:solidFill>
-                <a:effectLst/>
-                <a:uLnTx/>
-                <a:uFillTx/>
-                <a:latin typeface="Consolas" panose="020B0609020204030204" pitchFamily="49" charset="0"/>
-                <a:ea typeface="+mn-ea"/>
-                <a:cs typeface="+mn-cs"/>
-                <a:sym typeface="Helvetica Neue"/>
-              </a:rPr>
-              <a:t> request = </a:t>
-            </a:r>
-            <a:r>
-              <a:rPr kumimoji="0" lang="en-US" sz="2000" b="0" i="0" u="none" strike="noStrike" kern="0" cap="none" spc="0" normalizeH="0" baseline="0" noProof="0" dirty="0">
-                <a:ln>
-                  <a:noFill/>
-                </a:ln>
-                <a:solidFill>
-                  <a:srgbClr val="098658"/>
-                </a:solidFill>
-                <a:effectLst/>
-                <a:uLnTx/>
-                <a:uFillTx/>
-                <a:latin typeface="Consolas" panose="020B0609020204030204" pitchFamily="49" charset="0"/>
-                <a:ea typeface="+mn-ea"/>
-                <a:cs typeface="+mn-cs"/>
-                <a:sym typeface="Helvetica Neue"/>
-              </a:rPr>
-              <a:t>32</a:t>
-            </a:r>
-            <a:endParaRPr kumimoji="0" lang="en-US" sz="2000" b="0" i="0" u="none" strike="noStrike" kern="0" cap="none" spc="0" normalizeH="0" baseline="0" noProof="0" dirty="0">
-              <a:ln>
-                <a:noFill/>
-              </a:ln>
-              <a:solidFill>
-                <a:srgbClr val="000000"/>
-              </a:solidFill>
-              <a:effectLst/>
-              <a:uLnTx/>
-              <a:uFillTx/>
-              <a:latin typeface="Consolas" panose="020B0609020204030204" pitchFamily="49" charset="0"/>
-              <a:ea typeface="+mn-ea"/>
-              <a:cs typeface="+mn-cs"/>
-              <a:sym typeface="Helvetica Neue"/>
-            </a:endParaRPr>
-          </a:p>
-          <a:p>
-            <a:pPr marL="0" marR="0" lvl="0" indent="0" algn="l" defTabSz="1219169" rtl="0" eaLnBrk="1" fontAlgn="auto" latinLnBrk="0" hangingPunct="0">
-              <a:lnSpc>
-                <a:spcPct val="100000"/>
-              </a:lnSpc>
-              <a:spcBef>
-                <a:spcPts val="0"/>
-              </a:spcBef>
-              <a:spcAft>
-                <a:spcPts val="0"/>
-              </a:spcAft>
-              <a:buClrTx/>
-              <a:buSzTx/>
-              <a:buFontTx/>
-              <a:buNone/>
-              <a:tabLst/>
-              <a:defRPr/>
-            </a:pPr>
-            <a:r>
-              <a:rPr kumimoji="0" lang="en-US" sz="2000" b="0" i="0" u="none" strike="noStrike" kern="0" cap="none" spc="0" normalizeH="0" baseline="0" noProof="0" dirty="0">
-                <a:ln>
-                  <a:noFill/>
-                </a:ln>
-                <a:solidFill>
-                  <a:srgbClr val="000000"/>
-                </a:solidFill>
-                <a:effectLst/>
-                <a:uLnTx/>
-                <a:uFillTx/>
-                <a:latin typeface="Consolas" panose="020B0609020204030204" pitchFamily="49" charset="0"/>
-                <a:ea typeface="+mn-ea"/>
-                <a:cs typeface="+mn-cs"/>
-                <a:sym typeface="Helvetica Neue"/>
-              </a:rPr>
-              <a:t>    </a:t>
-            </a:r>
-            <a:r>
-              <a:rPr kumimoji="0" lang="en-US" sz="2000" b="0" i="0" u="none" strike="noStrike" kern="0" cap="none" spc="0" normalizeH="0" baseline="0" noProof="0" dirty="0">
-                <a:ln>
-                  <a:noFill/>
-                </a:ln>
-                <a:solidFill>
-                  <a:srgbClr val="0000FF"/>
-                </a:solidFill>
-                <a:effectLst/>
-                <a:uLnTx/>
-                <a:uFillTx/>
-                <a:latin typeface="Consolas" panose="020B0609020204030204" pitchFamily="49" charset="0"/>
-                <a:ea typeface="+mn-ea"/>
-                <a:cs typeface="+mn-cs"/>
-                <a:sym typeface="Helvetica Neue"/>
-              </a:rPr>
-              <a:t>const</a:t>
-            </a:r>
-            <a:r>
-              <a:rPr kumimoji="0" lang="en-US" sz="2000" b="0" i="0" u="none" strike="noStrike" kern="0" cap="none" spc="0" normalizeH="0" baseline="0" noProof="0" dirty="0">
-                <a:ln>
-                  <a:noFill/>
-                </a:ln>
-                <a:solidFill>
-                  <a:srgbClr val="000000"/>
-                </a:solidFill>
-                <a:effectLst/>
-                <a:uLnTx/>
-                <a:uFillTx/>
-                <a:latin typeface="Consolas" panose="020B0609020204030204" pitchFamily="49" charset="0"/>
-                <a:ea typeface="+mn-ea"/>
-                <a:cs typeface="+mn-cs"/>
-                <a:sym typeface="Helvetica Neue"/>
-              </a:rPr>
-              <a:t> res = </a:t>
-            </a:r>
-            <a:r>
-              <a:rPr kumimoji="0" lang="en-US" sz="2000" b="0" i="0" u="none" strike="noStrike" kern="0" cap="none" spc="0" normalizeH="0" baseline="0" noProof="0" dirty="0" err="1">
-                <a:ln>
-                  <a:noFill/>
-                </a:ln>
-                <a:solidFill>
-                  <a:srgbClr val="000000"/>
-                </a:solidFill>
-                <a:effectLst/>
-                <a:uLnTx/>
-                <a:uFillTx/>
-                <a:latin typeface="Consolas" panose="020B0609020204030204" pitchFamily="49" charset="0"/>
-                <a:ea typeface="+mn-ea"/>
-                <a:cs typeface="+mn-cs"/>
-                <a:sym typeface="Helvetica Neue"/>
-              </a:rPr>
-              <a:t>fakeRequest</a:t>
-            </a:r>
-            <a:r>
-              <a:rPr kumimoji="0" lang="en-US" sz="2000" b="0" i="0" u="none" strike="noStrike" kern="0" cap="none" spc="0" normalizeH="0" baseline="0" noProof="0" dirty="0">
-                <a:ln>
-                  <a:noFill/>
-                </a:ln>
-                <a:solidFill>
-                  <a:srgbClr val="000000"/>
-                </a:solidFill>
-                <a:effectLst/>
-                <a:uLnTx/>
-                <a:uFillTx/>
-                <a:latin typeface="Consolas" panose="020B0609020204030204" pitchFamily="49" charset="0"/>
-                <a:ea typeface="+mn-ea"/>
-                <a:cs typeface="+mn-cs"/>
-                <a:sym typeface="Helvetica Neue"/>
-              </a:rPr>
-              <a:t>(request);</a:t>
-            </a:r>
-          </a:p>
-          <a:p>
-            <a:pPr marL="0" marR="0" lvl="0" indent="0" algn="l" defTabSz="1219169" rtl="0" eaLnBrk="1" fontAlgn="auto" latinLnBrk="0" hangingPunct="0">
-              <a:lnSpc>
-                <a:spcPct val="100000"/>
-              </a:lnSpc>
-              <a:spcBef>
-                <a:spcPts val="0"/>
-              </a:spcBef>
-              <a:spcAft>
-                <a:spcPts val="0"/>
-              </a:spcAft>
-              <a:buClrTx/>
-              <a:buSzTx/>
-              <a:buFontTx/>
-              <a:buNone/>
-              <a:tabLst/>
-              <a:defRPr/>
-            </a:pPr>
-            <a:r>
-              <a:rPr kumimoji="0" lang="en-US" sz="2000" b="0" i="0" u="none" strike="noStrike" kern="0" cap="none" spc="0" normalizeH="0" baseline="0" noProof="0" dirty="0">
-                <a:ln>
-                  <a:noFill/>
-                </a:ln>
-                <a:solidFill>
-                  <a:srgbClr val="000000"/>
-                </a:solidFill>
-                <a:effectLst/>
-                <a:uLnTx/>
-                <a:uFillTx/>
-                <a:latin typeface="Consolas" panose="020B0609020204030204" pitchFamily="49" charset="0"/>
-                <a:ea typeface="+mn-ea"/>
-                <a:cs typeface="+mn-cs"/>
-                <a:sym typeface="Helvetica Neue"/>
-              </a:rPr>
-              <a:t>    console.log(</a:t>
-            </a:r>
-            <a:r>
-              <a:rPr kumimoji="0" lang="en-US" sz="2000" b="0" i="0" u="none" strike="noStrike" kern="0" cap="none" spc="0" normalizeH="0" baseline="0" noProof="0" dirty="0">
-                <a:ln>
-                  <a:noFill/>
-                </a:ln>
-                <a:solidFill>
-                  <a:srgbClr val="A31515"/>
-                </a:solidFill>
-                <a:effectLst/>
-                <a:uLnTx/>
-                <a:uFillTx/>
-                <a:latin typeface="Consolas" panose="020B0609020204030204" pitchFamily="49" charset="0"/>
-                <a:ea typeface="+mn-ea"/>
-                <a:cs typeface="+mn-cs"/>
-                <a:sym typeface="Helvetica Neue"/>
-              </a:rPr>
-              <a:t>`</a:t>
-            </a:r>
-            <a:r>
-              <a:rPr kumimoji="0" lang="en-US" sz="2000" b="0" i="0" u="none" strike="noStrike" kern="0" cap="none" spc="0" normalizeH="0" baseline="0" noProof="0" dirty="0" err="1">
-                <a:ln>
-                  <a:noFill/>
-                </a:ln>
-                <a:solidFill>
-                  <a:srgbClr val="A31515"/>
-                </a:solidFill>
-                <a:effectLst/>
-                <a:uLnTx/>
-                <a:uFillTx/>
-                <a:latin typeface="Consolas" panose="020B0609020204030204" pitchFamily="49" charset="0"/>
-                <a:ea typeface="+mn-ea"/>
-                <a:cs typeface="+mn-cs"/>
-                <a:sym typeface="Helvetica Neue"/>
-              </a:rPr>
-              <a:t>fakeRequest</a:t>
-            </a:r>
-            <a:r>
-              <a:rPr kumimoji="0" lang="en-US" sz="2000" b="0" i="0" u="none" strike="noStrike" kern="0" cap="none" spc="0" normalizeH="0" baseline="0" noProof="0" dirty="0">
-                <a:ln>
-                  <a:noFill/>
-                </a:ln>
-                <a:solidFill>
-                  <a:srgbClr val="A31515"/>
-                </a:solidFill>
-                <a:effectLst/>
-                <a:uLnTx/>
-                <a:uFillTx/>
-                <a:latin typeface="Consolas" panose="020B0609020204030204" pitchFamily="49" charset="0"/>
-                <a:ea typeface="+mn-ea"/>
-                <a:cs typeface="+mn-cs"/>
-                <a:sym typeface="Helvetica Neue"/>
-              </a:rPr>
-              <a:t>(</a:t>
-            </a:r>
-            <a:r>
-              <a:rPr kumimoji="0" lang="en-US" sz="2000" b="0" i="0" u="none" strike="noStrike" kern="0" cap="none" spc="0" normalizeH="0" baseline="0" noProof="0" dirty="0">
-                <a:ln>
-                  <a:noFill/>
-                </a:ln>
-                <a:solidFill>
-                  <a:srgbClr val="0000FF"/>
-                </a:solidFill>
-                <a:effectLst/>
-                <a:uLnTx/>
-                <a:uFillTx/>
-                <a:latin typeface="Consolas" panose="020B0609020204030204" pitchFamily="49" charset="0"/>
-                <a:ea typeface="+mn-ea"/>
-                <a:cs typeface="+mn-cs"/>
-                <a:sym typeface="Helvetica Neue"/>
-              </a:rPr>
-              <a:t>${</a:t>
-            </a:r>
-            <a:r>
-              <a:rPr kumimoji="0" lang="en-US" sz="2000" b="0" i="0" u="none" strike="noStrike" kern="0" cap="none" spc="0" normalizeH="0" baseline="0" noProof="0" dirty="0">
-                <a:ln>
-                  <a:noFill/>
-                </a:ln>
-                <a:solidFill>
-                  <a:srgbClr val="000000"/>
-                </a:solidFill>
-                <a:effectLst/>
-                <a:uLnTx/>
-                <a:uFillTx/>
-                <a:latin typeface="Consolas" panose="020B0609020204030204" pitchFamily="49" charset="0"/>
-                <a:ea typeface="+mn-ea"/>
-                <a:cs typeface="+mn-cs"/>
-                <a:sym typeface="Helvetica Neue"/>
-              </a:rPr>
-              <a:t>request</a:t>
-            </a:r>
-            <a:r>
-              <a:rPr kumimoji="0" lang="en-US" sz="2000" b="0" i="0" u="none" strike="noStrike" kern="0" cap="none" spc="0" normalizeH="0" baseline="0" noProof="0" dirty="0">
-                <a:ln>
-                  <a:noFill/>
-                </a:ln>
-                <a:solidFill>
-                  <a:srgbClr val="0000FF"/>
-                </a:solidFill>
-                <a:effectLst/>
-                <a:uLnTx/>
-                <a:uFillTx/>
-                <a:latin typeface="Consolas" panose="020B0609020204030204" pitchFamily="49" charset="0"/>
-                <a:ea typeface="+mn-ea"/>
-                <a:cs typeface="+mn-cs"/>
-                <a:sym typeface="Helvetica Neue"/>
-              </a:rPr>
-              <a:t>}</a:t>
-            </a:r>
-            <a:r>
-              <a:rPr kumimoji="0" lang="en-US" sz="2000" b="0" i="0" u="none" strike="noStrike" kern="0" cap="none" spc="0" normalizeH="0" baseline="0" noProof="0" dirty="0">
-                <a:ln>
-                  <a:noFill/>
-                </a:ln>
-                <a:solidFill>
-                  <a:srgbClr val="A31515"/>
-                </a:solidFill>
-                <a:effectLst/>
-                <a:uLnTx/>
-                <a:uFillTx/>
-                <a:latin typeface="Consolas" panose="020B0609020204030204" pitchFamily="49" charset="0"/>
-                <a:ea typeface="+mn-ea"/>
-                <a:cs typeface="+mn-cs"/>
-                <a:sym typeface="Helvetica Neue"/>
-              </a:rPr>
-              <a:t>) returned: </a:t>
-            </a:r>
-            <a:r>
-              <a:rPr kumimoji="0" lang="en-US" sz="2000" b="0" i="0" u="none" strike="noStrike" kern="0" cap="none" spc="0" normalizeH="0" baseline="0" noProof="0" dirty="0">
-                <a:ln>
-                  <a:noFill/>
-                </a:ln>
-                <a:solidFill>
-                  <a:srgbClr val="0000FF"/>
-                </a:solidFill>
-                <a:effectLst/>
-                <a:uLnTx/>
-                <a:uFillTx/>
-                <a:latin typeface="Consolas" panose="020B0609020204030204" pitchFamily="49" charset="0"/>
-                <a:ea typeface="+mn-ea"/>
-                <a:cs typeface="+mn-cs"/>
-                <a:sym typeface="Helvetica Neue"/>
-              </a:rPr>
-              <a:t>${</a:t>
-            </a:r>
-            <a:r>
-              <a:rPr kumimoji="0" lang="en-US" sz="2000" b="0" i="0" u="none" strike="noStrike" kern="0" cap="none" spc="0" normalizeH="0" baseline="0" noProof="0" dirty="0">
-                <a:ln>
-                  <a:noFill/>
-                </a:ln>
-                <a:solidFill>
-                  <a:srgbClr val="000000"/>
-                </a:solidFill>
-                <a:effectLst/>
-                <a:uLnTx/>
-                <a:uFillTx/>
-                <a:latin typeface="Consolas" panose="020B0609020204030204" pitchFamily="49" charset="0"/>
-                <a:ea typeface="+mn-ea"/>
-                <a:cs typeface="+mn-cs"/>
-                <a:sym typeface="Helvetica Neue"/>
-              </a:rPr>
-              <a:t>res</a:t>
-            </a:r>
-            <a:r>
-              <a:rPr kumimoji="0" lang="en-US" sz="2000" b="0" i="0" u="none" strike="noStrike" kern="0" cap="none" spc="0" normalizeH="0" baseline="0" noProof="0" dirty="0">
-                <a:ln>
-                  <a:noFill/>
-                </a:ln>
-                <a:solidFill>
-                  <a:srgbClr val="0000FF"/>
-                </a:solidFill>
-                <a:effectLst/>
-                <a:uLnTx/>
-                <a:uFillTx/>
-                <a:latin typeface="Consolas" panose="020B0609020204030204" pitchFamily="49" charset="0"/>
-                <a:ea typeface="+mn-ea"/>
-                <a:cs typeface="+mn-cs"/>
-                <a:sym typeface="Helvetica Neue"/>
-              </a:rPr>
-              <a:t>}</a:t>
-            </a:r>
-            <a:r>
-              <a:rPr kumimoji="0" lang="en-US" sz="2000" b="0" i="0" u="none" strike="noStrike" kern="0" cap="none" spc="0" normalizeH="0" baseline="0" noProof="0" dirty="0">
-                <a:ln>
-                  <a:noFill/>
-                </a:ln>
-                <a:solidFill>
-                  <a:srgbClr val="A31515"/>
-                </a:solidFill>
-                <a:effectLst/>
-                <a:uLnTx/>
-                <a:uFillTx/>
-                <a:latin typeface="Consolas" panose="020B0609020204030204" pitchFamily="49" charset="0"/>
-                <a:ea typeface="+mn-ea"/>
-                <a:cs typeface="+mn-cs"/>
-                <a:sym typeface="Helvetica Neue"/>
-              </a:rPr>
-              <a:t>`</a:t>
-            </a:r>
-            <a:r>
-              <a:rPr kumimoji="0" lang="en-US" sz="2000" b="0" i="0" u="none" strike="noStrike" kern="0" cap="none" spc="0" normalizeH="0" baseline="0" noProof="0" dirty="0">
-                <a:ln>
-                  <a:noFill/>
-                </a:ln>
-                <a:solidFill>
-                  <a:srgbClr val="000000"/>
-                </a:solidFill>
-                <a:effectLst/>
-                <a:uLnTx/>
-                <a:uFillTx/>
-                <a:latin typeface="Consolas" panose="020B0609020204030204" pitchFamily="49" charset="0"/>
-                <a:ea typeface="+mn-ea"/>
-                <a:cs typeface="+mn-cs"/>
-                <a:sym typeface="Helvetica Neue"/>
-              </a:rPr>
-              <a:t>);</a:t>
-            </a:r>
-          </a:p>
-          <a:p>
-            <a:pPr marL="0" marR="0" lvl="0" indent="0" algn="l" defTabSz="1219169" rtl="0" eaLnBrk="1" fontAlgn="auto" latinLnBrk="0" hangingPunct="0">
-              <a:lnSpc>
-                <a:spcPct val="100000"/>
-              </a:lnSpc>
-              <a:spcBef>
-                <a:spcPts val="0"/>
-              </a:spcBef>
-              <a:spcAft>
-                <a:spcPts val="0"/>
-              </a:spcAft>
-              <a:buClrTx/>
-              <a:buSzTx/>
-              <a:buFontTx/>
-              <a:buNone/>
-              <a:tabLst/>
-              <a:defRPr/>
-            </a:pPr>
-            <a:r>
-              <a:rPr kumimoji="0" lang="en-US" sz="2000" b="0" i="0" u="none" strike="noStrike" kern="0" cap="none" spc="0" normalizeH="0" baseline="0" noProof="0" dirty="0">
-                <a:ln>
-                  <a:noFill/>
-                </a:ln>
-                <a:solidFill>
-                  <a:srgbClr val="000000"/>
-                </a:solidFill>
-                <a:effectLst/>
-                <a:uLnTx/>
-                <a:uFillTx/>
-                <a:latin typeface="Consolas" panose="020B0609020204030204" pitchFamily="49" charset="0"/>
-                <a:ea typeface="+mn-ea"/>
-                <a:cs typeface="+mn-cs"/>
-                <a:sym typeface="Helvetica Neue"/>
-              </a:rPr>
-              <a:t>    console.log(</a:t>
-            </a:r>
-            <a:r>
-              <a:rPr kumimoji="0" lang="en-US" sz="2000" b="0" i="0" u="none" strike="noStrike" kern="0" cap="none" spc="0" normalizeH="0" baseline="0" noProof="0" dirty="0">
-                <a:ln>
-                  <a:noFill/>
-                </a:ln>
-                <a:solidFill>
-                  <a:srgbClr val="A31515"/>
-                </a:solidFill>
-                <a:effectLst/>
-                <a:uLnTx/>
-                <a:uFillTx/>
-                <a:latin typeface="Consolas" panose="020B0609020204030204" pitchFamily="49" charset="0"/>
-                <a:ea typeface="+mn-ea"/>
-                <a:cs typeface="+mn-cs"/>
-                <a:sym typeface="Helvetica Neue"/>
-              </a:rPr>
-              <a:t>'main done'</a:t>
-            </a:r>
-            <a:r>
-              <a:rPr kumimoji="0" lang="en-US" sz="2000" b="0" i="0" u="none" strike="noStrike" kern="0" cap="none" spc="0" normalizeH="0" baseline="0" noProof="0" dirty="0">
-                <a:ln>
-                  <a:noFill/>
-                </a:ln>
-                <a:solidFill>
-                  <a:srgbClr val="000000"/>
-                </a:solidFill>
-                <a:effectLst/>
-                <a:uLnTx/>
-                <a:uFillTx/>
-                <a:latin typeface="Consolas" panose="020B0609020204030204" pitchFamily="49" charset="0"/>
-                <a:ea typeface="+mn-ea"/>
-                <a:cs typeface="+mn-cs"/>
-                <a:sym typeface="Helvetica Neue"/>
-              </a:rPr>
-              <a:t>);</a:t>
-            </a:r>
-          </a:p>
-          <a:p>
-            <a:pPr marL="0" marR="0" lvl="0" indent="0" algn="l" defTabSz="1219169" rtl="0" eaLnBrk="1" fontAlgn="auto" latinLnBrk="0" hangingPunct="0">
-              <a:lnSpc>
-                <a:spcPct val="100000"/>
-              </a:lnSpc>
-              <a:spcBef>
-                <a:spcPts val="0"/>
-              </a:spcBef>
-              <a:spcAft>
-                <a:spcPts val="0"/>
-              </a:spcAft>
-              <a:buClrTx/>
-              <a:buSzTx/>
-              <a:buFontTx/>
-              <a:buNone/>
-              <a:tabLst/>
-              <a:defRPr/>
-            </a:pPr>
-            <a:r>
-              <a:rPr kumimoji="0" lang="en-US" sz="2000" b="0" i="0" u="none" strike="noStrike" kern="0" cap="none" spc="0" normalizeH="0" baseline="0" noProof="0" dirty="0">
-                <a:ln>
-                  <a:noFill/>
-                </a:ln>
-                <a:solidFill>
-                  <a:srgbClr val="000000"/>
-                </a:solidFill>
-                <a:effectLst/>
-                <a:uLnTx/>
-                <a:uFillTx/>
-                <a:latin typeface="Consolas" panose="020B0609020204030204" pitchFamily="49" charset="0"/>
-                <a:ea typeface="+mn-ea"/>
-                <a:cs typeface="+mn-cs"/>
-                <a:sym typeface="Helvetica Neue"/>
-              </a:rPr>
-              <a:t>}</a:t>
-            </a:r>
-          </a:p>
-          <a:p>
-            <a:endParaRPr lang="en-US" dirty="0"/>
+              <a:t> 2: Side-effect before </a:t>
+            </a:r>
+            <a:r>
+              <a:rPr lang="en-US" b="1" dirty="0"/>
+              <a:t>await</a:t>
+            </a:r>
           </a:p>
         </p:txBody>
       </p:sp>
@@ -27439,7 +26646,7 @@
           <p:cNvPr id="4" name="Slide Number Placeholder 3">
             <a:extLst>
               <a:ext uri="{FF2B5EF4-FFF2-40B4-BE49-F238E27FC236}">
-                <a16:creationId xmlns:a16="http://schemas.microsoft.com/office/drawing/2014/main" id="{44E9E064-70D6-F269-FC5D-0708F7361734}"/>
+                <a16:creationId xmlns:a16="http://schemas.microsoft.com/office/drawing/2014/main" id="{A9E8AE3D-F9F1-A80A-92FB-EF7AA9EA5372}"/>
               </a:ext>
             </a:extLst>
           </p:cNvPr>
@@ -27507,250 +26714,6 @@
                 <a:defRPr/>
               </a:pPr>
               <a:t>26</a:t>
-            </a:fld>
-            <a:endParaRPr kumimoji="0" lang="en-US" sz="1200" b="0" i="0" u="none" strike="noStrike" kern="1200" cap="none" spc="0" normalizeH="0" baseline="0" noProof="0">
-              <a:ln>
-                <a:noFill/>
-              </a:ln>
-              <a:solidFill>
-                <a:prstClr val="black">
-                  <a:tint val="75000"/>
-                </a:prstClr>
-              </a:solidFill>
-              <a:effectLst/>
-              <a:uLnTx/>
-              <a:uFillTx/>
-              <a:latin typeface="Calibri" panose="020F0502020204030204"/>
-              <a:ea typeface="+mn-ea"/>
-              <a:cs typeface="+mn-cs"/>
-            </a:endParaRPr>
-          </a:p>
-        </p:txBody>
-      </p:sp>
-      <p:sp>
-        <p:nvSpPr>
-          <p:cNvPr id="5" name="Rectangle: Rounded Corners 4">
-            <a:extLst>
-              <a:ext uri="{FF2B5EF4-FFF2-40B4-BE49-F238E27FC236}">
-                <a16:creationId xmlns:a16="http://schemas.microsoft.com/office/drawing/2014/main" id="{D71F20BD-32DB-08D0-DF0A-F124A57FD915}"/>
-              </a:ext>
-            </a:extLst>
-          </p:cNvPr>
-          <p:cNvSpPr/>
-          <p:nvPr/>
-        </p:nvSpPr>
-        <p:spPr>
-          <a:xfrm>
-            <a:off x="6763601" y="136525"/>
-            <a:ext cx="5180920" cy="601981"/>
-          </a:xfrm>
-          <a:prstGeom prst="roundRect">
-            <a:avLst/>
-          </a:prstGeom>
-          <a:solidFill>
-            <a:schemeClr val="accent6">
-              <a:lumMod val="20000"/>
-              <a:lumOff val="80000"/>
-            </a:schemeClr>
-          </a:solidFill>
-          <a:ln>
-            <a:solidFill>
-              <a:srgbClr val="0070C0"/>
-            </a:solidFill>
-          </a:ln>
-        </p:spPr>
-        <p:style>
-          <a:lnRef idx="2">
-            <a:schemeClr val="accent1">
-              <a:shade val="50000"/>
-            </a:schemeClr>
-          </a:lnRef>
-          <a:fillRef idx="1">
-            <a:schemeClr val="accent1"/>
-          </a:fillRef>
-          <a:effectRef idx="0">
-            <a:schemeClr val="accent1"/>
-          </a:effectRef>
-          <a:fontRef idx="minor">
-            <a:schemeClr val="lt1"/>
-          </a:fontRef>
-        </p:style>
-        <p:txBody>
-          <a:bodyPr rtlCol="0" anchor="ctr"/>
-          <a:lstStyle/>
-          <a:p>
-            <a:pPr algn="ctr"/>
-            <a:r>
-              <a:rPr lang="en-US" sz="2400" dirty="0" err="1">
-                <a:solidFill>
-                  <a:schemeClr val="tx1"/>
-                </a:solidFill>
-              </a:rPr>
-              <a:t>src</a:t>
-            </a:r>
-            <a:r>
-              <a:rPr lang="en-US" sz="2400" dirty="0">
-                <a:solidFill>
-                  <a:schemeClr val="tx1"/>
-                </a:solidFill>
-              </a:rPr>
-              <a:t>/Slides/</a:t>
-            </a:r>
-            <a:r>
-              <a:rPr lang="en-US" sz="2400" dirty="0" err="1">
-                <a:solidFill>
-                  <a:schemeClr val="tx1"/>
-                </a:solidFill>
-              </a:rPr>
-              <a:t>oneRequestNoAwait.ts</a:t>
-            </a:r>
-            <a:endParaRPr lang="en-US" sz="2400" dirty="0">
-              <a:solidFill>
-                <a:schemeClr val="tx1"/>
-              </a:solidFill>
-            </a:endParaRPr>
-          </a:p>
-        </p:txBody>
-      </p:sp>
-    </p:spTree>
-    <p:extLst>
-      <p:ext uri="{BB962C8B-B14F-4D97-AF65-F5344CB8AC3E}">
-        <p14:creationId xmlns:p14="http://schemas.microsoft.com/office/powerpoint/2010/main" val="1941022130"/>
-      </p:ext>
-    </p:extLst>
-  </p:cSld>
-  <p:clrMapOvr>
-    <a:masterClrMapping/>
-  </p:clrMapOvr>
-</p:sld>
-</file>
-
-<file path=ppt/slides/slide27.xml><?xml version="1.0" encoding="utf-8"?>
-<p:sld xmlns:a="http://schemas.openxmlformats.org/drawingml/2006/main" xmlns:r="http://schemas.openxmlformats.org/officeDocument/2006/relationships" xmlns:p="http://schemas.openxmlformats.org/presentationml/2006/main">
-  <p:cSld>
-    <p:spTree>
-      <p:nvGrpSpPr>
-        <p:cNvPr id="1" name=""/>
-        <p:cNvGrpSpPr/>
-        <p:nvPr/>
-      </p:nvGrpSpPr>
-      <p:grpSpPr>
-        <a:xfrm>
-          <a:off x="0" y="0"/>
-          <a:ext cx="0" cy="0"/>
-          <a:chOff x="0" y="0"/>
-          <a:chExt cx="0" cy="0"/>
-        </a:xfrm>
-      </p:grpSpPr>
-      <p:sp>
-        <p:nvSpPr>
-          <p:cNvPr id="2" name="Title 1">
-            <a:extLst>
-              <a:ext uri="{FF2B5EF4-FFF2-40B4-BE49-F238E27FC236}">
-                <a16:creationId xmlns:a16="http://schemas.microsoft.com/office/drawing/2014/main" id="{7E3C3C71-F774-1710-A3D1-D12E7FEC9D88}"/>
-              </a:ext>
-            </a:extLst>
-          </p:cNvPr>
-          <p:cNvSpPr>
-            <a:spLocks noGrp="1"/>
-          </p:cNvSpPr>
-          <p:nvPr>
-            <p:ph type="title"/>
-          </p:nvPr>
-        </p:nvSpPr>
-        <p:spPr/>
-        <p:txBody>
-          <a:bodyPr/>
-          <a:lstStyle/>
-          <a:p>
-            <a:r>
-              <a:rPr lang="en-US" dirty="0" err="1"/>
-              <a:t>AntiPattern</a:t>
-            </a:r>
-            <a:r>
-              <a:rPr lang="en-US" dirty="0"/>
-              <a:t> 2: Side-effect before </a:t>
-            </a:r>
-            <a:r>
-              <a:rPr lang="en-US" b="1" dirty="0"/>
-              <a:t>await</a:t>
-            </a:r>
-          </a:p>
-        </p:txBody>
-      </p:sp>
-      <p:sp>
-        <p:nvSpPr>
-          <p:cNvPr id="4" name="Slide Number Placeholder 3">
-            <a:extLst>
-              <a:ext uri="{FF2B5EF4-FFF2-40B4-BE49-F238E27FC236}">
-                <a16:creationId xmlns:a16="http://schemas.microsoft.com/office/drawing/2014/main" id="{A9E8AE3D-F9F1-A80A-92FB-EF7AA9EA5372}"/>
-              </a:ext>
-            </a:extLst>
-          </p:cNvPr>
-          <p:cNvSpPr>
-            <a:spLocks noGrp="1"/>
-          </p:cNvSpPr>
-          <p:nvPr>
-            <p:ph type="sldNum" sz="quarter" idx="12"/>
-          </p:nvPr>
-        </p:nvSpPr>
-        <p:spPr/>
-        <p:txBody>
-          <a:bodyPr/>
-          <a:lstStyle/>
-          <a:p>
-            <a:pPr marL="0" marR="0" lvl="0" indent="0" algn="r" defTabSz="914400" rtl="0" eaLnBrk="1" fontAlgn="auto" latinLnBrk="0" hangingPunct="1">
-              <a:lnSpc>
-                <a:spcPct val="100000"/>
-              </a:lnSpc>
-              <a:spcBef>
-                <a:spcPts val="0"/>
-              </a:spcBef>
-              <a:spcAft>
-                <a:spcPts val="0"/>
-              </a:spcAft>
-              <a:buClrTx/>
-              <a:buSzTx/>
-              <a:buFontTx/>
-              <a:buNone/>
-              <a:tabLst/>
-              <a:defRPr/>
-            </a:pPr>
-            <a:fld id="{20F37917-FD3A-4669-9018-DA04BCDD3D75}" type="slidenum">
-              <a:rPr kumimoji="0" lang="en-US" sz="1200" b="0" i="0" u="none" strike="noStrike" kern="1200" cap="none" spc="0" normalizeH="0" baseline="0" noProof="0" smtClean="0">
-                <a:ln>
-                  <a:noFill/>
-                </a:ln>
-                <a:solidFill>
-                  <a:prstClr val="black">
-                    <a:tint val="75000"/>
-                  </a:prstClr>
-                </a:solidFill>
-                <a:effectLst/>
-                <a:uLnTx/>
-                <a:uFillTx/>
-                <a:latin typeface="Calibri" panose="020F0502020204030204"/>
-                <a:ea typeface="+mn-ea"/>
-                <a:cs typeface="+mn-cs"/>
-              </a:rPr>
-              <a:pPr marL="0" marR="0" lvl="0" indent="0" algn="r" defTabSz="914400" rtl="0" eaLnBrk="1" fontAlgn="auto" latinLnBrk="0" hangingPunct="1">
-                <a:lnSpc>
-                  <a:spcPct val="100000"/>
-                </a:lnSpc>
-                <a:spcBef>
-                  <a:spcPts val="0"/>
-                </a:spcBef>
-                <a:spcAft>
-                  <a:spcPts val="0"/>
-                </a:spcAft>
-                <a:buClrTx/>
-                <a:buSzTx/>
-                <a:buFontTx/>
-                <a:buNone/>
-                <a:tabLst/>
-                <a:defRPr/>
-              </a:pPr>
-              <a:t>27</a:t>
             </a:fld>
             <a:endParaRPr kumimoji="0" lang="en-US" sz="1200" b="0" i="0" u="none" strike="noStrike" kern="1200" cap="none" spc="0" normalizeH="0" baseline="0" noProof="0">
               <a:ln>
@@ -28918,7 +27881,7 @@
 </p:sld>
 </file>
 
-<file path=ppt/slides/slide28.xml><?xml version="1.0" encoding="utf-8"?>
+<file path=ppt/slides/slide27.xml><?xml version="1.0" encoding="utf-8"?>
 <p:sld xmlns:a="http://schemas.openxmlformats.org/drawingml/2006/main" xmlns:r="http://schemas.openxmlformats.org/officeDocument/2006/relationships" xmlns:p="http://schemas.openxmlformats.org/presentationml/2006/main">
   <p:cSld>
     <p:spTree>
@@ -29035,7 +27998,7 @@
                 <a:tabLst/>
                 <a:defRPr/>
               </a:pPr>
-              <a:t>28</a:t>
+              <a:t>27</a:t>
             </a:fld>
             <a:endParaRPr kumimoji="0" lang="en-US" sz="1200" b="0" i="0" u="none" strike="noStrike" kern="1200" cap="none" spc="0" normalizeH="0" baseline="0" noProof="0">
               <a:ln>
@@ -29333,7 +28296,7 @@
 </p:sld>
 </file>
 
-<file path=ppt/slides/slide29.xml><?xml version="1.0" encoding="utf-8"?>
+<file path=ppt/slides/slide28.xml><?xml version="1.0" encoding="utf-8"?>
 <p:sld xmlns:a="http://schemas.openxmlformats.org/drawingml/2006/main" xmlns:r="http://schemas.openxmlformats.org/officeDocument/2006/relationships" xmlns:p="http://schemas.openxmlformats.org/presentationml/2006/main">
   <p:cSld>
     <p:spTree>
@@ -29422,7 +28385,7 @@
                 <a:tabLst/>
                 <a:defRPr/>
               </a:pPr>
-              <a:t>29</a:t>
+              <a:t>28</a:t>
             </a:fld>
             <a:endParaRPr kumimoji="0" lang="en-US" sz="1200" b="0" i="0" u="none" strike="noStrike" kern="1200" cap="none" spc="0" normalizeH="0" baseline="0" noProof="0">
               <a:ln>
@@ -29745,6 +28708,419 @@
 </p:sld>
 </file>
 
+<file path=ppt/slides/slide29.xml><?xml version="1.0" encoding="utf-8"?>
+<p:sld xmlns:a="http://schemas.openxmlformats.org/drawingml/2006/main" xmlns:r="http://schemas.openxmlformats.org/officeDocument/2006/relationships" xmlns:p="http://schemas.openxmlformats.org/presentationml/2006/main">
+  <p:cSld>
+    <p:spTree>
+      <p:nvGrpSpPr>
+        <p:cNvPr id="1" name=""/>
+        <p:cNvGrpSpPr/>
+        <p:nvPr/>
+      </p:nvGrpSpPr>
+      <p:grpSpPr>
+        <a:xfrm>
+          <a:off x="0" y="0"/>
+          <a:ext cx="0" cy="0"/>
+          <a:chOff x="0" y="0"/>
+          <a:chExt cx="0" cy="0"/>
+        </a:xfrm>
+      </p:grpSpPr>
+      <p:sp>
+        <p:nvSpPr>
+          <p:cNvPr id="2" name="Title 1">
+            <a:extLst>
+              <a:ext uri="{FF2B5EF4-FFF2-40B4-BE49-F238E27FC236}">
+                <a16:creationId xmlns:a16="http://schemas.microsoft.com/office/drawing/2014/main" id="{F0197F1B-AB6B-840B-6109-A5F224D49245}"/>
+              </a:ext>
+            </a:extLst>
+          </p:cNvPr>
+          <p:cNvSpPr>
+            <a:spLocks noGrp="1"/>
+          </p:cNvSpPr>
+          <p:nvPr>
+            <p:ph type="title"/>
+          </p:nvPr>
+        </p:nvSpPr>
+        <p:spPr/>
+        <p:txBody>
+          <a:bodyPr/>
+          <a:lstStyle/>
+          <a:p>
+            <a:r>
+              <a:rPr lang="en-US" dirty="0"/>
+              <a:t>Answer: JS/TS has some primitives for starting a non-blocking computation</a:t>
+            </a:r>
+          </a:p>
+        </p:txBody>
+      </p:sp>
+      <p:sp>
+        <p:nvSpPr>
+          <p:cNvPr id="3" name="Content Placeholder 2">
+            <a:extLst>
+              <a:ext uri="{FF2B5EF4-FFF2-40B4-BE49-F238E27FC236}">
+                <a16:creationId xmlns:a16="http://schemas.microsoft.com/office/drawing/2014/main" id="{2703E4AB-0914-33F5-4E7F-B4F98687C364}"/>
+              </a:ext>
+            </a:extLst>
+          </p:cNvPr>
+          <p:cNvSpPr>
+            <a:spLocks noGrp="1"/>
+          </p:cNvSpPr>
+          <p:nvPr>
+            <p:ph idx="1"/>
+          </p:nvPr>
+        </p:nvSpPr>
+        <p:spPr>
+          <a:xfrm>
+            <a:off x="838200" y="1500160"/>
+            <a:ext cx="7977810" cy="4403683"/>
+          </a:xfrm>
+        </p:spPr>
+        <p:txBody>
+          <a:bodyPr>
+            <a:normAutofit fontScale="92500" lnSpcReduction="10000"/>
+          </a:bodyPr>
+          <a:lstStyle/>
+          <a:p>
+            <a:r>
+              <a:rPr lang="en-US" dirty="0"/>
+              <a:t>These are things like http requests, I/O operations, or timers.</a:t>
+            </a:r>
+          </a:p>
+          <a:p>
+            <a:r>
+              <a:rPr lang="en-US" dirty="0"/>
+              <a:t>Each of these returns a promise that you can </a:t>
+            </a:r>
+            <a:r>
+              <a:rPr lang="en-US" b="1" dirty="0"/>
+              <a:t>await</a:t>
+            </a:r>
+            <a:r>
+              <a:rPr lang="en-US" dirty="0"/>
+              <a:t>.  The promise runs while it is pending, and produces the response from the http request, or the contents of the file, etc.</a:t>
+            </a:r>
+          </a:p>
+          <a:p>
+            <a:r>
+              <a:rPr lang="en-US" dirty="0"/>
+              <a:t>You will hardly ever call one of these primitives yourself; usually they are wrapped in a convenient procedure, e.g., we write</a:t>
+            </a:r>
+          </a:p>
+          <a:p>
+            <a:pPr marL="0" indent="0">
+              <a:buNone/>
+            </a:pPr>
+            <a:r>
+              <a:rPr lang="en-US" b="0" dirty="0">
+                <a:solidFill>
+                  <a:srgbClr val="0070C1"/>
+                </a:solidFill>
+                <a:effectLst/>
+                <a:latin typeface="Consolas" panose="020B0609020204030204" pitchFamily="49" charset="0"/>
+              </a:rPr>
+              <a:t>	</a:t>
+            </a:r>
+            <a:r>
+              <a:rPr lang="en-US" b="0" dirty="0" err="1">
+                <a:solidFill>
+                  <a:srgbClr val="0070C1"/>
+                </a:solidFill>
+                <a:effectLst/>
+                <a:latin typeface="Consolas" panose="020B0609020204030204" pitchFamily="49" charset="0"/>
+              </a:rPr>
+              <a:t>axios</a:t>
+            </a:r>
+            <a:r>
+              <a:rPr lang="en-US" b="0" dirty="0" err="1">
+                <a:solidFill>
+                  <a:srgbClr val="000000"/>
+                </a:solidFill>
+                <a:effectLst/>
+                <a:latin typeface="Consolas" panose="020B0609020204030204" pitchFamily="49" charset="0"/>
+              </a:rPr>
+              <a:t>.</a:t>
+            </a:r>
+            <a:r>
+              <a:rPr lang="en-US" b="0" dirty="0" err="1">
+                <a:solidFill>
+                  <a:srgbClr val="795E26"/>
+                </a:solidFill>
+                <a:effectLst/>
+                <a:latin typeface="Consolas" panose="020B0609020204030204" pitchFamily="49" charset="0"/>
+              </a:rPr>
+              <a:t>get</a:t>
+            </a:r>
+            <a:r>
+              <a:rPr lang="en-US" b="0" dirty="0">
+                <a:solidFill>
+                  <a:srgbClr val="000000"/>
+                </a:solidFill>
+                <a:effectLst/>
+                <a:latin typeface="Consolas" panose="020B0609020204030204" pitchFamily="49" charset="0"/>
+              </a:rPr>
+              <a:t>(</a:t>
+            </a:r>
+            <a:r>
+              <a:rPr lang="en-US" b="0" dirty="0">
+                <a:solidFill>
+                  <a:srgbClr val="A31515"/>
+                </a:solidFill>
+                <a:effectLst/>
+                <a:latin typeface="Consolas" panose="020B0609020204030204" pitchFamily="49" charset="0"/>
+              </a:rPr>
+              <a:t>'https://rest-</a:t>
+            </a:r>
+            <a:r>
+              <a:rPr lang="en-US" b="0" dirty="0" err="1">
+                <a:solidFill>
+                  <a:srgbClr val="A31515"/>
+                </a:solidFill>
+                <a:effectLst/>
+                <a:latin typeface="Consolas" panose="020B0609020204030204" pitchFamily="49" charset="0"/>
+              </a:rPr>
+              <a:t>example.covey.town</a:t>
+            </a:r>
+            <a:r>
+              <a:rPr lang="en-US" dirty="0">
+                <a:solidFill>
+                  <a:srgbClr val="A31515"/>
+                </a:solidFill>
+                <a:latin typeface="Consolas" panose="020B0609020204030204" pitchFamily="49" charset="0"/>
+              </a:rPr>
+              <a:t>’</a:t>
+            </a:r>
+            <a:r>
+              <a:rPr lang="en-US" b="0" dirty="0">
+                <a:solidFill>
+                  <a:srgbClr val="000000"/>
+                </a:solidFill>
+                <a:effectLst/>
+                <a:latin typeface="Consolas" panose="020B0609020204030204" pitchFamily="49" charset="0"/>
+              </a:rPr>
+              <a:t>)</a:t>
+            </a:r>
+          </a:p>
+          <a:p>
+            <a:pPr marL="0" indent="0">
+              <a:buNone/>
+            </a:pPr>
+            <a:r>
+              <a:rPr lang="en-US" dirty="0"/>
+              <a:t>  to make an http request, or </a:t>
+            </a:r>
+          </a:p>
+          <a:p>
+            <a:pPr marL="0" indent="0">
+              <a:buNone/>
+            </a:pPr>
+            <a:r>
+              <a:rPr lang="en-US" b="0" dirty="0">
+                <a:solidFill>
+                  <a:srgbClr val="267F99"/>
+                </a:solidFill>
+                <a:effectLst/>
+                <a:latin typeface="Consolas" panose="020B0609020204030204" pitchFamily="49" charset="0"/>
+              </a:rPr>
+              <a:t>	</a:t>
+            </a:r>
+            <a:r>
+              <a:rPr lang="en-US" b="0" dirty="0" err="1">
+                <a:solidFill>
+                  <a:srgbClr val="267F99"/>
+                </a:solidFill>
+                <a:effectLst/>
+                <a:latin typeface="Consolas" panose="020B0609020204030204" pitchFamily="49" charset="0"/>
+              </a:rPr>
+              <a:t>fs</a:t>
+            </a:r>
+            <a:r>
+              <a:rPr lang="en-US" b="0" dirty="0" err="1">
+                <a:solidFill>
+                  <a:srgbClr val="000000"/>
+                </a:solidFill>
+                <a:effectLst/>
+                <a:latin typeface="Consolas" panose="020B0609020204030204" pitchFamily="49" charset="0"/>
+              </a:rPr>
+              <a:t>.</a:t>
+            </a:r>
+            <a:r>
+              <a:rPr lang="en-US" b="0" dirty="0" err="1">
+                <a:solidFill>
+                  <a:srgbClr val="795E26"/>
+                </a:solidFill>
+                <a:effectLst/>
+                <a:latin typeface="Consolas" panose="020B0609020204030204" pitchFamily="49" charset="0"/>
+              </a:rPr>
+              <a:t>readFile</a:t>
+            </a:r>
+            <a:r>
+              <a:rPr lang="en-US" b="0" dirty="0">
+                <a:solidFill>
+                  <a:srgbClr val="000000"/>
+                </a:solidFill>
+                <a:effectLst/>
+                <a:latin typeface="Consolas" panose="020B0609020204030204" pitchFamily="49" charset="0"/>
+              </a:rPr>
+              <a:t>(</a:t>
+            </a:r>
+            <a:r>
+              <a:rPr lang="en-US" b="0" dirty="0">
+                <a:solidFill>
+                  <a:srgbClr val="001080"/>
+                </a:solidFill>
+                <a:effectLst/>
+                <a:latin typeface="Consolas" panose="020B0609020204030204" pitchFamily="49" charset="0"/>
+              </a:rPr>
+              <a:t>filename)</a:t>
+            </a:r>
+          </a:p>
+          <a:p>
+            <a:pPr marL="0" indent="0">
+              <a:buNone/>
+            </a:pPr>
+            <a:r>
+              <a:rPr lang="en-US" dirty="0"/>
+              <a:t>  to read the contents of a file.</a:t>
+            </a:r>
+          </a:p>
+        </p:txBody>
+      </p:sp>
+      <p:sp>
+        <p:nvSpPr>
+          <p:cNvPr id="4" name="Slide Number Placeholder 3">
+            <a:extLst>
+              <a:ext uri="{FF2B5EF4-FFF2-40B4-BE49-F238E27FC236}">
+                <a16:creationId xmlns:a16="http://schemas.microsoft.com/office/drawing/2014/main" id="{60F72ED1-8460-2361-2157-861495642043}"/>
+              </a:ext>
+            </a:extLst>
+          </p:cNvPr>
+          <p:cNvSpPr>
+            <a:spLocks noGrp="1"/>
+          </p:cNvSpPr>
+          <p:nvPr>
+            <p:ph type="sldNum" sz="quarter" idx="12"/>
+          </p:nvPr>
+        </p:nvSpPr>
+        <p:spPr/>
+        <p:txBody>
+          <a:bodyPr/>
+          <a:lstStyle/>
+          <a:p>
+            <a:pPr marL="0" marR="0" lvl="0" indent="0" algn="r" defTabSz="914400" rtl="0" eaLnBrk="1" fontAlgn="auto" latinLnBrk="0" hangingPunct="1">
+              <a:lnSpc>
+                <a:spcPct val="100000"/>
+              </a:lnSpc>
+              <a:spcBef>
+                <a:spcPts val="0"/>
+              </a:spcBef>
+              <a:spcAft>
+                <a:spcPts val="0"/>
+              </a:spcAft>
+              <a:buClrTx/>
+              <a:buSzTx/>
+              <a:buFontTx/>
+              <a:buNone/>
+              <a:tabLst/>
+              <a:defRPr/>
+            </a:pPr>
+            <a:fld id="{20F37917-FD3A-4669-9018-DA04BCDD3D75}" type="slidenum">
+              <a:rPr kumimoji="0" lang="en-US" sz="1200" b="0" i="0" u="none" strike="noStrike" kern="1200" cap="none" spc="0" normalizeH="0" baseline="0" noProof="0" smtClean="0">
+                <a:ln>
+                  <a:noFill/>
+                </a:ln>
+                <a:solidFill>
+                  <a:prstClr val="black">
+                    <a:tint val="75000"/>
+                  </a:prstClr>
+                </a:solidFill>
+                <a:effectLst/>
+                <a:uLnTx/>
+                <a:uFillTx/>
+                <a:latin typeface="Calibri" panose="020F0502020204030204"/>
+                <a:ea typeface="+mn-ea"/>
+                <a:cs typeface="+mn-cs"/>
+              </a:rPr>
+              <a:pPr marL="0" marR="0" lvl="0" indent="0" algn="r" defTabSz="914400" rtl="0" eaLnBrk="1" fontAlgn="auto" latinLnBrk="0" hangingPunct="1">
+                <a:lnSpc>
+                  <a:spcPct val="100000"/>
+                </a:lnSpc>
+                <a:spcBef>
+                  <a:spcPts val="0"/>
+                </a:spcBef>
+                <a:spcAft>
+                  <a:spcPts val="0"/>
+                </a:spcAft>
+                <a:buClrTx/>
+                <a:buSzTx/>
+                <a:buFontTx/>
+                <a:buNone/>
+                <a:tabLst/>
+                <a:defRPr/>
+              </a:pPr>
+              <a:t>29</a:t>
+            </a:fld>
+            <a:endParaRPr kumimoji="0" lang="en-US" sz="1200" b="0" i="0" u="none" strike="noStrike" kern="1200" cap="none" spc="0" normalizeH="0" baseline="0" noProof="0">
+              <a:ln>
+                <a:noFill/>
+              </a:ln>
+              <a:solidFill>
+                <a:prstClr val="black">
+                  <a:tint val="75000"/>
+                </a:prstClr>
+              </a:solidFill>
+              <a:effectLst/>
+              <a:uLnTx/>
+              <a:uFillTx/>
+              <a:latin typeface="Calibri" panose="020F0502020204030204"/>
+              <a:ea typeface="+mn-ea"/>
+              <a:cs typeface="+mn-cs"/>
+            </a:endParaRPr>
+          </a:p>
+        </p:txBody>
+      </p:sp>
+      <p:pic>
+        <p:nvPicPr>
+          <p:cNvPr id="5" name="Picture 4">
+            <a:extLst>
+              <a:ext uri="{FF2B5EF4-FFF2-40B4-BE49-F238E27FC236}">
+                <a16:creationId xmlns:a16="http://schemas.microsoft.com/office/drawing/2014/main" id="{D6522DE9-0421-F750-27F0-655F93E36D8C}"/>
+              </a:ext>
+            </a:extLst>
+          </p:cNvPr>
+          <p:cNvPicPr>
+            <a:picLocks noChangeAspect="1"/>
+          </p:cNvPicPr>
+          <p:nvPr/>
+        </p:nvPicPr>
+        <p:blipFill>
+          <a:blip r:embed="rId3"/>
+          <a:stretch>
+            <a:fillRect/>
+          </a:stretch>
+        </p:blipFill>
+        <p:spPr>
+          <a:xfrm>
+            <a:off x="8610600" y="3879850"/>
+            <a:ext cx="2876117" cy="2476500"/>
+          </a:xfrm>
+          <a:prstGeom prst="rect">
+            <a:avLst/>
+          </a:prstGeom>
+        </p:spPr>
+      </p:pic>
+    </p:spTree>
+    <p:extLst>
+      <p:ext uri="{BB962C8B-B14F-4D97-AF65-F5344CB8AC3E}">
+        <p14:creationId xmlns:p14="http://schemas.microsoft.com/office/powerpoint/2010/main" val="226957645"/>
+      </p:ext>
+    </p:extLst>
+  </p:cSld>
+  <p:clrMapOvr>
+    <a:masterClrMapping/>
+  </p:clrMapOvr>
+</p:sld>
+</file>
+
 <file path=ppt/slides/slide3.xml><?xml version="1.0" encoding="utf-8"?>
 <p:sld xmlns:a="http://schemas.openxmlformats.org/drawingml/2006/main" xmlns:r="http://schemas.openxmlformats.org/officeDocument/2006/relationships" xmlns:p="http://schemas.openxmlformats.org/presentationml/2006/main">
   <p:cSld>
@@ -29913,7 +29289,7 @@
           </a:prstGeom>
           <a:extLst>
             <a:ext uri="{C572A759-6A51-4108-AA02-DFA0A04FC94B}">
-              <ma14:wrappingTextBoxFlag xmlns:ma14="http://schemas.microsoft.com/office/mac/drawingml/2011/main" xmlns:a14="http://schemas.microsoft.com/office/drawing/2010/main" xmlns:m="http://schemas.openxmlformats.org/officeDocument/2006/math" xmlns="" val="1"/>
+              <ma14:wrappingTextBoxFlag xmlns="" xmlns:m="http://schemas.openxmlformats.org/officeDocument/2006/math" xmlns:a14="http://schemas.microsoft.com/office/drawing/2010/main" xmlns:ma14="http://schemas.microsoft.com/office/mac/drawingml/2011/main" val="1"/>
             </a:ext>
           </a:extLst>
         </p:spPr>
@@ -30303,7 +29679,7 @@
               </a:effectLst>
               <a:extLst>
                 <a:ext uri="{C572A759-6A51-4108-AA02-DFA0A04FC94B}">
-                  <ma14:wrappingTextBoxFlag xmlns:ma14="http://schemas.microsoft.com/office/mac/drawingml/2011/main" xmlns:a14="http://schemas.microsoft.com/office/drawing/2010/main" xmlns:m="http://schemas.openxmlformats.org/officeDocument/2006/math" xmlns="" val="1"/>
+                  <ma14:wrappingTextBoxFlag xmlns="" xmlns:m="http://schemas.openxmlformats.org/officeDocument/2006/math" xmlns:a14="http://schemas.microsoft.com/office/drawing/2010/main" xmlns:ma14="http://schemas.microsoft.com/office/mac/drawingml/2011/main" val="1"/>
                 </a:ext>
               </a:extLst>
             </p:spPr>
@@ -30373,7 +29749,7 @@
               </a:effectLst>
               <a:extLst>
                 <a:ext uri="{C572A759-6A51-4108-AA02-DFA0A04FC94B}">
-                  <ma14:wrappingTextBoxFlag xmlns:ma14="http://schemas.microsoft.com/office/mac/drawingml/2011/main" xmlns:a14="http://schemas.microsoft.com/office/drawing/2010/main" xmlns:m="http://schemas.openxmlformats.org/officeDocument/2006/math" xmlns="" val="1"/>
+                  <ma14:wrappingTextBoxFlag xmlns="" xmlns:m="http://schemas.openxmlformats.org/officeDocument/2006/math" xmlns:a14="http://schemas.microsoft.com/office/drawing/2010/main" xmlns:ma14="http://schemas.microsoft.com/office/mac/drawingml/2011/main" val="1"/>
                 </a:ext>
               </a:extLst>
             </p:spPr>
@@ -30441,7 +29817,7 @@
               </a:effectLst>
               <a:extLst>
                 <a:ext uri="{C572A759-6A51-4108-AA02-DFA0A04FC94B}">
-                  <ma14:wrappingTextBoxFlag xmlns:ma14="http://schemas.microsoft.com/office/mac/drawingml/2011/main" xmlns:a14="http://schemas.microsoft.com/office/drawing/2010/main" xmlns:m="http://schemas.openxmlformats.org/officeDocument/2006/math" xmlns="" val="1"/>
+                  <ma14:wrappingTextBoxFlag xmlns="" xmlns:m="http://schemas.openxmlformats.org/officeDocument/2006/math" xmlns:a14="http://schemas.microsoft.com/office/drawing/2010/main" xmlns:ma14="http://schemas.microsoft.com/office/mac/drawingml/2011/main" val="1"/>
                 </a:ext>
               </a:extLst>
             </p:spPr>
@@ -30529,7 +29905,7 @@
                 </a:effectLst>
                 <a:extLst>
                   <a:ext uri="{C572A759-6A51-4108-AA02-DFA0A04FC94B}">
-                    <ma14:wrappingTextBoxFlag xmlns:ma14="http://schemas.microsoft.com/office/mac/drawingml/2011/main" xmlns:a14="http://schemas.microsoft.com/office/drawing/2010/main" xmlns:m="http://schemas.openxmlformats.org/officeDocument/2006/math" xmlns="" val="1"/>
+                    <ma14:wrappingTextBoxFlag xmlns="" xmlns:m="http://schemas.openxmlformats.org/officeDocument/2006/math" xmlns:a14="http://schemas.microsoft.com/office/drawing/2010/main" xmlns:ma14="http://schemas.microsoft.com/office/mac/drawingml/2011/main" val="1"/>
                   </a:ext>
                 </a:extLst>
               </p:spPr>
@@ -30707,7 +30083,7 @@
                   <a:effectLst/>
                   <a:extLst>
                     <a:ext uri="{C572A759-6A51-4108-AA02-DFA0A04FC94B}">
-                      <ma14:wrappingTextBoxFlag xmlns:ma14="http://schemas.microsoft.com/office/mac/drawingml/2011/main" xmlns:a14="http://schemas.microsoft.com/office/drawing/2010/main" xmlns:m="http://schemas.openxmlformats.org/officeDocument/2006/math" xmlns="" val="1"/>
+                      <ma14:wrappingTextBoxFlag xmlns="" xmlns:m="http://schemas.openxmlformats.org/officeDocument/2006/math" xmlns:a14="http://schemas.microsoft.com/office/drawing/2010/main" xmlns:ma14="http://schemas.microsoft.com/office/mac/drawingml/2011/main" val="1"/>
                     </a:ext>
                   </a:extLst>
                 </p:spPr>
@@ -30907,7 +30283,7 @@
                   <a:effectLst/>
                   <a:extLst>
                     <a:ext uri="{C572A759-6A51-4108-AA02-DFA0A04FC94B}">
-                      <ma14:wrappingTextBoxFlag xmlns:ma14="http://schemas.microsoft.com/office/mac/drawingml/2011/main" xmlns:a14="http://schemas.microsoft.com/office/drawing/2010/main" xmlns:m="http://schemas.openxmlformats.org/officeDocument/2006/math" xmlns="" val="1"/>
+                      <ma14:wrappingTextBoxFlag xmlns="" xmlns:m="http://schemas.openxmlformats.org/officeDocument/2006/math" xmlns:a14="http://schemas.microsoft.com/office/drawing/2010/main" xmlns:ma14="http://schemas.microsoft.com/office/mac/drawingml/2011/main" val="1"/>
                     </a:ext>
                   </a:extLst>
                 </p:spPr>
@@ -30997,7 +30373,7 @@
                 </a:effectLst>
                 <a:extLst>
                   <a:ext uri="{C572A759-6A51-4108-AA02-DFA0A04FC94B}">
-                    <ma14:wrappingTextBoxFlag xmlns:ma14="http://schemas.microsoft.com/office/mac/drawingml/2011/main" xmlns:a14="http://schemas.microsoft.com/office/drawing/2010/main" xmlns:m="http://schemas.openxmlformats.org/officeDocument/2006/math" xmlns="" val="1"/>
+                    <ma14:wrappingTextBoxFlag xmlns="" xmlns:m="http://schemas.openxmlformats.org/officeDocument/2006/math" xmlns:a14="http://schemas.microsoft.com/office/drawing/2010/main" xmlns:ma14="http://schemas.microsoft.com/office/mac/drawingml/2011/main" val="1"/>
                   </a:ext>
                 </a:extLst>
               </p:spPr>
@@ -31175,7 +30551,7 @@
                   <a:effectLst/>
                   <a:extLst>
                     <a:ext uri="{C572A759-6A51-4108-AA02-DFA0A04FC94B}">
-                      <ma14:wrappingTextBoxFlag xmlns:ma14="http://schemas.microsoft.com/office/mac/drawingml/2011/main" xmlns:a14="http://schemas.microsoft.com/office/drawing/2010/main" xmlns:m="http://schemas.openxmlformats.org/officeDocument/2006/math" xmlns="" val="1"/>
+                      <ma14:wrappingTextBoxFlag xmlns="" xmlns:m="http://schemas.openxmlformats.org/officeDocument/2006/math" xmlns:a14="http://schemas.microsoft.com/office/drawing/2010/main" xmlns:ma14="http://schemas.microsoft.com/office/mac/drawingml/2011/main" val="1"/>
                     </a:ext>
                   </a:extLst>
                 </p:spPr>
@@ -31265,7 +30641,7 @@
                 </a:effectLst>
                 <a:extLst>
                   <a:ext uri="{C572A759-6A51-4108-AA02-DFA0A04FC94B}">
-                    <ma14:wrappingTextBoxFlag xmlns:ma14="http://schemas.microsoft.com/office/mac/drawingml/2011/main" xmlns:a14="http://schemas.microsoft.com/office/drawing/2010/main" xmlns:m="http://schemas.openxmlformats.org/officeDocument/2006/math" xmlns="" val="1"/>
+                    <ma14:wrappingTextBoxFlag xmlns="" xmlns:m="http://schemas.openxmlformats.org/officeDocument/2006/math" xmlns:a14="http://schemas.microsoft.com/office/drawing/2010/main" xmlns:ma14="http://schemas.microsoft.com/office/mac/drawingml/2011/main" val="1"/>
                   </a:ext>
                 </a:extLst>
               </p:spPr>
@@ -31443,7 +30819,7 @@
                   <a:effectLst/>
                   <a:extLst>
                     <a:ext uri="{C572A759-6A51-4108-AA02-DFA0A04FC94B}">
-                      <ma14:wrappingTextBoxFlag xmlns:ma14="http://schemas.microsoft.com/office/mac/drawingml/2011/main" xmlns:a14="http://schemas.microsoft.com/office/drawing/2010/main" xmlns:m="http://schemas.openxmlformats.org/officeDocument/2006/math" xmlns="" val="1"/>
+                      <ma14:wrappingTextBoxFlag xmlns="" xmlns:m="http://schemas.openxmlformats.org/officeDocument/2006/math" xmlns:a14="http://schemas.microsoft.com/office/drawing/2010/main" xmlns:ma14="http://schemas.microsoft.com/office/mac/drawingml/2011/main" val="1"/>
                     </a:ext>
                   </a:extLst>
                 </p:spPr>
@@ -31514,7 +30890,7 @@
             </a:effectLst>
             <a:extLst>
               <a:ext uri="{C572A759-6A51-4108-AA02-DFA0A04FC94B}">
-                <ma14:wrappingTextBoxFlag xmlns:ma14="http://schemas.microsoft.com/office/mac/drawingml/2011/main" xmlns:a14="http://schemas.microsoft.com/office/drawing/2010/main" xmlns:m="http://schemas.openxmlformats.org/officeDocument/2006/math" xmlns="" val="1"/>
+                <ma14:wrappingTextBoxFlag xmlns="" xmlns:m="http://schemas.openxmlformats.org/officeDocument/2006/math" xmlns:a14="http://schemas.microsoft.com/office/drawing/2010/main" xmlns:ma14="http://schemas.microsoft.com/office/mac/drawingml/2011/main" val="1"/>
               </a:ext>
             </a:extLst>
           </p:spPr>
@@ -31741,7 +31117,7 @@
           </a:prstGeom>
           <a:extLst>
             <a:ext uri="{C572A759-6A51-4108-AA02-DFA0A04FC94B}">
-              <ma14:wrappingTextBoxFlag xmlns:ma14="http://schemas.microsoft.com/office/mac/drawingml/2011/main" xmlns:a14="http://schemas.microsoft.com/office/drawing/2010/main" xmlns:m="http://schemas.openxmlformats.org/officeDocument/2006/math" xmlns="" val="1"/>
+              <ma14:wrappingTextBoxFlag xmlns="" xmlns:m="http://schemas.openxmlformats.org/officeDocument/2006/math" xmlns:a14="http://schemas.microsoft.com/office/drawing/2010/main" xmlns:ma14="http://schemas.microsoft.com/office/mac/drawingml/2011/main" val="1"/>
             </a:ext>
           </a:extLst>
         </p:spPr>
@@ -32307,7 +31683,7 @@
           <p:cNvPr id="2" name="Title 1">
             <a:extLst>
               <a:ext uri="{FF2B5EF4-FFF2-40B4-BE49-F238E27FC236}">
-                <a16:creationId xmlns:a16="http://schemas.microsoft.com/office/drawing/2014/main" id="{F0197F1B-AB6B-840B-6109-A5F224D49245}"/>
+                <a16:creationId xmlns:a16="http://schemas.microsoft.com/office/drawing/2014/main" id="{29121F2F-6CF4-38E5-4111-58D01708C3D0}"/>
               </a:ext>
             </a:extLst>
           </p:cNvPr>
@@ -32325,239 +31701,7 @@
           <a:p>
             <a:r>
               <a:rPr lang="en-US" dirty="0"/>
-              <a:t>Answer: JS/TS has some primitives for starting a non-blocking computation</a:t>
-            </a:r>
-          </a:p>
-        </p:txBody>
-      </p:sp>
-      <p:sp>
-        <p:nvSpPr>
-          <p:cNvPr id="3" name="Content Placeholder 2">
-            <a:extLst>
-              <a:ext uri="{FF2B5EF4-FFF2-40B4-BE49-F238E27FC236}">
-                <a16:creationId xmlns:a16="http://schemas.microsoft.com/office/drawing/2014/main" id="{2703E4AB-0914-33F5-4E7F-B4F98687C364}"/>
-              </a:ext>
-            </a:extLst>
-          </p:cNvPr>
-          <p:cNvSpPr>
-            <a:spLocks noGrp="1"/>
-          </p:cNvSpPr>
-          <p:nvPr>
-            <p:ph idx="1"/>
-          </p:nvPr>
-        </p:nvSpPr>
-        <p:spPr>
-          <a:xfrm>
-            <a:off x="838200" y="1500160"/>
-            <a:ext cx="7977810" cy="4403683"/>
-          </a:xfrm>
-        </p:spPr>
-        <p:txBody>
-          <a:bodyPr>
-            <a:normAutofit fontScale="92500" lnSpcReduction="10000"/>
-          </a:bodyPr>
-          <a:lstStyle/>
-          <a:p>
-            <a:r>
-              <a:rPr lang="en-US" dirty="0"/>
-              <a:t>These are things like http requests, I/O operations, or timers.</a:t>
-            </a:r>
-          </a:p>
-          <a:p>
-            <a:r>
-              <a:rPr lang="en-US" dirty="0"/>
-              <a:t>Each of these returns a promise that you can </a:t>
-            </a:r>
-            <a:r>
-              <a:rPr lang="en-US" b="1" dirty="0"/>
-              <a:t>await</a:t>
-            </a:r>
-            <a:r>
-              <a:rPr lang="en-US" dirty="0"/>
-              <a:t>.  The promise runs while it is pending, and produces the response from the http request, or the contents of the file, etc.</a:t>
-            </a:r>
-          </a:p>
-          <a:p>
-            <a:r>
-              <a:rPr lang="en-US" dirty="0"/>
-              <a:t>You will hardly ever call one of these primitives yourself; usually they are wrapped in a convenient procedure, e.g., we write</a:t>
-            </a:r>
-          </a:p>
-          <a:p>
-            <a:pPr marL="0" indent="0">
-              <a:buNone/>
-            </a:pPr>
-            <a:r>
-              <a:rPr lang="en-US" b="0" dirty="0">
-                <a:solidFill>
-                  <a:srgbClr val="0070C1"/>
-                </a:solidFill>
-                <a:effectLst/>
-                <a:latin typeface="Consolas" panose="020B0609020204030204" pitchFamily="49" charset="0"/>
-              </a:rPr>
-              <a:t>	</a:t>
-            </a:r>
-            <a:r>
-              <a:rPr lang="en-US" b="0" dirty="0" err="1">
-                <a:solidFill>
-                  <a:srgbClr val="0070C1"/>
-                </a:solidFill>
-                <a:effectLst/>
-                <a:latin typeface="Consolas" panose="020B0609020204030204" pitchFamily="49" charset="0"/>
-              </a:rPr>
-              <a:t>axios</a:t>
-            </a:r>
-            <a:r>
-              <a:rPr lang="en-US" b="0" dirty="0" err="1">
-                <a:solidFill>
-                  <a:srgbClr val="000000"/>
-                </a:solidFill>
-                <a:effectLst/>
-                <a:latin typeface="Consolas" panose="020B0609020204030204" pitchFamily="49" charset="0"/>
-              </a:rPr>
-              <a:t>.</a:t>
-            </a:r>
-            <a:r>
-              <a:rPr lang="en-US" b="0" dirty="0" err="1">
-                <a:solidFill>
-                  <a:srgbClr val="795E26"/>
-                </a:solidFill>
-                <a:effectLst/>
-                <a:latin typeface="Consolas" panose="020B0609020204030204" pitchFamily="49" charset="0"/>
-              </a:rPr>
-              <a:t>get</a:t>
-            </a:r>
-            <a:r>
-              <a:rPr lang="en-US" b="0" dirty="0">
-                <a:solidFill>
-                  <a:srgbClr val="000000"/>
-                </a:solidFill>
-                <a:effectLst/>
-                <a:latin typeface="Consolas" panose="020B0609020204030204" pitchFamily="49" charset="0"/>
-              </a:rPr>
-              <a:t>(</a:t>
-            </a:r>
-            <a:r>
-              <a:rPr lang="en-US" b="0" dirty="0">
-                <a:solidFill>
-                  <a:srgbClr val="A31515"/>
-                </a:solidFill>
-                <a:effectLst/>
-                <a:latin typeface="Consolas" panose="020B0609020204030204" pitchFamily="49" charset="0"/>
-              </a:rPr>
-              <a:t>'https://rest-</a:t>
-            </a:r>
-            <a:r>
-              <a:rPr lang="en-US" b="0" dirty="0" err="1">
-                <a:solidFill>
-                  <a:srgbClr val="A31515"/>
-                </a:solidFill>
-                <a:effectLst/>
-                <a:latin typeface="Consolas" panose="020B0609020204030204" pitchFamily="49" charset="0"/>
-              </a:rPr>
-              <a:t>example.covey.town</a:t>
-            </a:r>
-            <a:r>
-              <a:rPr lang="en-US" dirty="0">
-                <a:solidFill>
-                  <a:srgbClr val="A31515"/>
-                </a:solidFill>
-                <a:latin typeface="Consolas" panose="020B0609020204030204" pitchFamily="49" charset="0"/>
-              </a:rPr>
-              <a:t>’</a:t>
-            </a:r>
-            <a:r>
-              <a:rPr lang="en-US" b="0" dirty="0">
-                <a:solidFill>
-                  <a:srgbClr val="000000"/>
-                </a:solidFill>
-                <a:effectLst/>
-                <a:latin typeface="Consolas" panose="020B0609020204030204" pitchFamily="49" charset="0"/>
-              </a:rPr>
-              <a:t>)</a:t>
-            </a:r>
-          </a:p>
-          <a:p>
-            <a:pPr marL="0" indent="0">
-              <a:buNone/>
-            </a:pPr>
-            <a:r>
-              <a:rPr lang="en-US" dirty="0"/>
-              <a:t>  to make an http request, or </a:t>
-            </a:r>
-          </a:p>
-          <a:p>
-            <a:pPr marL="0" indent="0">
-              <a:buNone/>
-            </a:pPr>
-            <a:r>
-              <a:rPr lang="en-US" b="0" dirty="0">
-                <a:solidFill>
-                  <a:srgbClr val="267F99"/>
-                </a:solidFill>
-                <a:effectLst/>
-                <a:latin typeface="Consolas" panose="020B0609020204030204" pitchFamily="49" charset="0"/>
-              </a:rPr>
-              <a:t>	</a:t>
-            </a:r>
-            <a:r>
-              <a:rPr lang="en-US" b="0" dirty="0" err="1">
-                <a:solidFill>
-                  <a:srgbClr val="267F99"/>
-                </a:solidFill>
-                <a:effectLst/>
-                <a:latin typeface="Consolas" panose="020B0609020204030204" pitchFamily="49" charset="0"/>
-              </a:rPr>
-              <a:t>fs</a:t>
-            </a:r>
-            <a:r>
-              <a:rPr lang="en-US" b="0" dirty="0" err="1">
-                <a:solidFill>
-                  <a:srgbClr val="000000"/>
-                </a:solidFill>
-                <a:effectLst/>
-                <a:latin typeface="Consolas" panose="020B0609020204030204" pitchFamily="49" charset="0"/>
-              </a:rPr>
-              <a:t>.</a:t>
-            </a:r>
-            <a:r>
-              <a:rPr lang="en-US" b="0" dirty="0" err="1">
-                <a:solidFill>
-                  <a:srgbClr val="795E26"/>
-                </a:solidFill>
-                <a:effectLst/>
-                <a:latin typeface="Consolas" panose="020B0609020204030204" pitchFamily="49" charset="0"/>
-              </a:rPr>
-              <a:t>readFile</a:t>
-            </a:r>
-            <a:r>
-              <a:rPr lang="en-US" b="0" dirty="0">
-                <a:solidFill>
-                  <a:srgbClr val="000000"/>
-                </a:solidFill>
-                <a:effectLst/>
-                <a:latin typeface="Consolas" panose="020B0609020204030204" pitchFamily="49" charset="0"/>
-              </a:rPr>
-              <a:t>(</a:t>
-            </a:r>
-            <a:r>
-              <a:rPr lang="en-US" b="0" dirty="0">
-                <a:solidFill>
-                  <a:srgbClr val="001080"/>
-                </a:solidFill>
-                <a:effectLst/>
-                <a:latin typeface="Consolas" panose="020B0609020204030204" pitchFamily="49" charset="0"/>
-              </a:rPr>
-              <a:t>filename)</a:t>
-            </a:r>
-          </a:p>
-          <a:p>
-            <a:pPr marL="0" indent="0">
-              <a:buNone/>
-            </a:pPr>
-            <a:r>
-              <a:rPr lang="en-US" dirty="0"/>
-              <a:t>  to read the contents of a file.</a:t>
+              <a:t>Let’s put it all together</a:t>
             </a:r>
           </a:p>
         </p:txBody>
@@ -32567,7 +31711,7 @@
           <p:cNvPr id="4" name="Slide Number Placeholder 3">
             <a:extLst>
               <a:ext uri="{FF2B5EF4-FFF2-40B4-BE49-F238E27FC236}">
-                <a16:creationId xmlns:a16="http://schemas.microsoft.com/office/drawing/2014/main" id="{60F72ED1-8460-2361-2157-861495642043}"/>
+                <a16:creationId xmlns:a16="http://schemas.microsoft.com/office/drawing/2014/main" id="{04664315-99D5-1896-D0BB-CD09B9541421}"/>
               </a:ext>
             </a:extLst>
           </p:cNvPr>
@@ -32635,187 +31779,6 @@
                 <a:defRPr/>
               </a:pPr>
               <a:t>30</a:t>
-            </a:fld>
-            <a:endParaRPr kumimoji="0" lang="en-US" sz="1200" b="0" i="0" u="none" strike="noStrike" kern="1200" cap="none" spc="0" normalizeH="0" baseline="0" noProof="0">
-              <a:ln>
-                <a:noFill/>
-              </a:ln>
-              <a:solidFill>
-                <a:prstClr val="black">
-                  <a:tint val="75000"/>
-                </a:prstClr>
-              </a:solidFill>
-              <a:effectLst/>
-              <a:uLnTx/>
-              <a:uFillTx/>
-              <a:latin typeface="Calibri" panose="020F0502020204030204"/>
-              <a:ea typeface="+mn-ea"/>
-              <a:cs typeface="+mn-cs"/>
-            </a:endParaRPr>
-          </a:p>
-        </p:txBody>
-      </p:sp>
-      <p:pic>
-        <p:nvPicPr>
-          <p:cNvPr id="5" name="Picture 4">
-            <a:extLst>
-              <a:ext uri="{FF2B5EF4-FFF2-40B4-BE49-F238E27FC236}">
-                <a16:creationId xmlns:a16="http://schemas.microsoft.com/office/drawing/2014/main" id="{D6522DE9-0421-F750-27F0-655F93E36D8C}"/>
-              </a:ext>
-            </a:extLst>
-          </p:cNvPr>
-          <p:cNvPicPr>
-            <a:picLocks noChangeAspect="1"/>
-          </p:cNvPicPr>
-          <p:nvPr/>
-        </p:nvPicPr>
-        <p:blipFill>
-          <a:blip r:embed="rId3"/>
-          <a:stretch>
-            <a:fillRect/>
-          </a:stretch>
-        </p:blipFill>
-        <p:spPr>
-          <a:xfrm>
-            <a:off x="8610600" y="3879850"/>
-            <a:ext cx="2876117" cy="2476500"/>
-          </a:xfrm>
-          <a:prstGeom prst="rect">
-            <a:avLst/>
-          </a:prstGeom>
-        </p:spPr>
-      </p:pic>
-    </p:spTree>
-    <p:extLst>
-      <p:ext uri="{BB962C8B-B14F-4D97-AF65-F5344CB8AC3E}">
-        <p14:creationId xmlns:p14="http://schemas.microsoft.com/office/powerpoint/2010/main" val="226957645"/>
-      </p:ext>
-    </p:extLst>
-  </p:cSld>
-  <p:clrMapOvr>
-    <a:masterClrMapping/>
-  </p:clrMapOvr>
-</p:sld>
-</file>
-
-<file path=ppt/slides/slide31.xml><?xml version="1.0" encoding="utf-8"?>
-<p:sld xmlns:a="http://schemas.openxmlformats.org/drawingml/2006/main" xmlns:r="http://schemas.openxmlformats.org/officeDocument/2006/relationships" xmlns:p="http://schemas.openxmlformats.org/presentationml/2006/main">
-  <p:cSld>
-    <p:spTree>
-      <p:nvGrpSpPr>
-        <p:cNvPr id="1" name=""/>
-        <p:cNvGrpSpPr/>
-        <p:nvPr/>
-      </p:nvGrpSpPr>
-      <p:grpSpPr>
-        <a:xfrm>
-          <a:off x="0" y="0"/>
-          <a:ext cx="0" cy="0"/>
-          <a:chOff x="0" y="0"/>
-          <a:chExt cx="0" cy="0"/>
-        </a:xfrm>
-      </p:grpSpPr>
-      <p:sp>
-        <p:nvSpPr>
-          <p:cNvPr id="2" name="Title 1">
-            <a:extLst>
-              <a:ext uri="{FF2B5EF4-FFF2-40B4-BE49-F238E27FC236}">
-                <a16:creationId xmlns:a16="http://schemas.microsoft.com/office/drawing/2014/main" id="{29121F2F-6CF4-38E5-4111-58D01708C3D0}"/>
-              </a:ext>
-            </a:extLst>
-          </p:cNvPr>
-          <p:cNvSpPr>
-            <a:spLocks noGrp="1"/>
-          </p:cNvSpPr>
-          <p:nvPr>
-            <p:ph type="title"/>
-          </p:nvPr>
-        </p:nvSpPr>
-        <p:spPr/>
-        <p:txBody>
-          <a:bodyPr/>
-          <a:lstStyle/>
-          <a:p>
-            <a:r>
-              <a:rPr lang="en-US" dirty="0"/>
-              <a:t>Let’s put it all together</a:t>
-            </a:r>
-          </a:p>
-        </p:txBody>
-      </p:sp>
-      <p:sp>
-        <p:nvSpPr>
-          <p:cNvPr id="4" name="Slide Number Placeholder 3">
-            <a:extLst>
-              <a:ext uri="{FF2B5EF4-FFF2-40B4-BE49-F238E27FC236}">
-                <a16:creationId xmlns:a16="http://schemas.microsoft.com/office/drawing/2014/main" id="{04664315-99D5-1896-D0BB-CD09B9541421}"/>
-              </a:ext>
-            </a:extLst>
-          </p:cNvPr>
-          <p:cNvSpPr>
-            <a:spLocks noGrp="1"/>
-          </p:cNvSpPr>
-          <p:nvPr>
-            <p:ph type="sldNum" sz="quarter" idx="12"/>
-          </p:nvPr>
-        </p:nvSpPr>
-        <p:spPr/>
-        <p:txBody>
-          <a:bodyPr/>
-          <a:lstStyle/>
-          <a:p>
-            <a:pPr marL="0" marR="0" lvl="0" indent="0" algn="r" defTabSz="914400" rtl="0" eaLnBrk="1" fontAlgn="auto" latinLnBrk="0" hangingPunct="1">
-              <a:lnSpc>
-                <a:spcPct val="100000"/>
-              </a:lnSpc>
-              <a:spcBef>
-                <a:spcPts val="0"/>
-              </a:spcBef>
-              <a:spcAft>
-                <a:spcPts val="0"/>
-              </a:spcAft>
-              <a:buClrTx/>
-              <a:buSzTx/>
-              <a:buFontTx/>
-              <a:buNone/>
-              <a:tabLst/>
-              <a:defRPr/>
-            </a:pPr>
-            <a:fld id="{20F37917-FD3A-4669-9018-DA04BCDD3D75}" type="slidenum">
-              <a:rPr kumimoji="0" lang="en-US" sz="1200" b="0" i="0" u="none" strike="noStrike" kern="1200" cap="none" spc="0" normalizeH="0" baseline="0" noProof="0" smtClean="0">
-                <a:ln>
-                  <a:noFill/>
-                </a:ln>
-                <a:solidFill>
-                  <a:prstClr val="black">
-                    <a:tint val="75000"/>
-                  </a:prstClr>
-                </a:solidFill>
-                <a:effectLst/>
-                <a:uLnTx/>
-                <a:uFillTx/>
-                <a:latin typeface="Calibri" panose="020F0502020204030204"/>
-                <a:ea typeface="+mn-ea"/>
-                <a:cs typeface="+mn-cs"/>
-              </a:rPr>
-              <a:pPr marL="0" marR="0" lvl="0" indent="0" algn="r" defTabSz="914400" rtl="0" eaLnBrk="1" fontAlgn="auto" latinLnBrk="0" hangingPunct="1">
-                <a:lnSpc>
-                  <a:spcPct val="100000"/>
-                </a:lnSpc>
-                <a:spcBef>
-                  <a:spcPts val="0"/>
-                </a:spcBef>
-                <a:spcAft>
-                  <a:spcPts val="0"/>
-                </a:spcAft>
-                <a:buClrTx/>
-                <a:buSzTx/>
-                <a:buFontTx/>
-                <a:buNone/>
-                <a:tabLst/>
-                <a:defRPr/>
-              </a:pPr>
-              <a:t>31</a:t>
             </a:fld>
             <a:endParaRPr kumimoji="0" lang="en-US" sz="1200" b="0" i="0" u="none" strike="noStrike" kern="1200" cap="none" spc="0" normalizeH="0" baseline="0" noProof="0">
               <a:ln>
@@ -32948,7 +31911,7 @@
 </p:sld>
 </file>
 
-<file path=ppt/slides/slide32.xml><?xml version="1.0" encoding="utf-8"?>
+<file path=ppt/slides/slide31.xml><?xml version="1.0" encoding="utf-8"?>
 <p:sld xmlns:a="http://schemas.openxmlformats.org/drawingml/2006/main" xmlns:r="http://schemas.openxmlformats.org/officeDocument/2006/relationships" xmlns:p="http://schemas.openxmlformats.org/presentationml/2006/main">
   <p:cSld>
     <p:spTree>
@@ -33065,7 +32028,7 @@
                 <a:tabLst/>
                 <a:defRPr/>
               </a:pPr>
-              <a:t>32</a:t>
+              <a:t>31</a:t>
             </a:fld>
             <a:endParaRPr kumimoji="0" lang="en-US" sz="1200" b="0" i="0" u="none" strike="noStrike" kern="1200" cap="none" spc="0" normalizeH="0" baseline="0" noProof="0">
               <a:ln>
@@ -33323,7 +32286,7 @@
 </p:sld>
 </file>
 
-<file path=ppt/slides/slide33.xml><?xml version="1.0" encoding="utf-8"?>
+<file path=ppt/slides/slide32.xml><?xml version="1.0" encoding="utf-8"?>
 <p:sld xmlns:a="http://schemas.openxmlformats.org/drawingml/2006/main" xmlns:r="http://schemas.openxmlformats.org/officeDocument/2006/relationships" xmlns:p="http://schemas.openxmlformats.org/presentationml/2006/main">
   <p:cSld>
     <p:spTree>
@@ -33473,7 +32436,7 @@
 </p:sld>
 </file>
 
-<file path=ppt/slides/slide34.xml><?xml version="1.0" encoding="utf-8"?>
+<file path=ppt/slides/slide33.xml><?xml version="1.0" encoding="utf-8"?>
 <p:sld xmlns:a="http://schemas.openxmlformats.org/drawingml/2006/main" xmlns:r="http://schemas.openxmlformats.org/officeDocument/2006/relationships" xmlns:p="http://schemas.openxmlformats.org/presentationml/2006/main">
   <p:cSld>
     <p:spTree>
@@ -33590,7 +32553,7 @@
                 <a:tabLst/>
                 <a:defRPr/>
               </a:pPr>
-              <a:t>34</a:t>
+              <a:t>33</a:t>
             </a:fld>
             <a:endParaRPr kumimoji="0" lang="en-US" sz="1200" b="0" i="0" u="none" strike="noStrike" kern="1200" cap="none" spc="0" normalizeH="0" baseline="0" noProof="0">
               <a:ln>
@@ -33624,7 +32587,7 @@
 </p:sld>
 </file>
 
-<file path=ppt/slides/slide35.xml><?xml version="1.0" encoding="utf-8"?>
+<file path=ppt/slides/slide34.xml><?xml version="1.0" encoding="utf-8"?>
 <p:sld xmlns:a="http://schemas.openxmlformats.org/drawingml/2006/main" xmlns:r="http://schemas.openxmlformats.org/officeDocument/2006/relationships" xmlns:p="http://schemas.openxmlformats.org/presentationml/2006/main">
   <p:cSld>
     <p:spTree>
@@ -33785,7 +32748,7 @@
           </a:ln>
           <a:extLst>
             <a:ext uri="{C572A759-6A51-4108-AA02-DFA0A04FC94B}">
-              <ma14:wrappingTextBoxFlag xmlns="" xmlns:m="http://schemas.openxmlformats.org/officeDocument/2006/math" xmlns:a14="http://schemas.microsoft.com/office/drawing/2010/main" xmlns:ma14="http://schemas.microsoft.com/office/mac/drawingml/2011/main" val="1"/>
+              <ma14:wrappingTextBoxFlag xmlns:ma14="http://schemas.microsoft.com/office/mac/drawingml/2011/main" xmlns:a14="http://schemas.microsoft.com/office/drawing/2010/main" xmlns:m="http://schemas.openxmlformats.org/officeDocument/2006/math" xmlns="" val="1"/>
             </a:ext>
           </a:extLst>
         </p:spPr>
@@ -34633,7 +33596,7 @@
 </p:sld>
 </file>
 
-<file path=ppt/slides/slide36.xml><?xml version="1.0" encoding="utf-8"?>
+<file path=ppt/slides/slide35.xml><?xml version="1.0" encoding="utf-8"?>
 <p:sld xmlns:a="http://schemas.openxmlformats.org/drawingml/2006/main" xmlns:r="http://schemas.openxmlformats.org/officeDocument/2006/relationships" xmlns:p="http://schemas.openxmlformats.org/presentationml/2006/main">
   <p:cSld>
     <p:spTree>
@@ -35647,7 +34610,7 @@
 </p:sld>
 </file>
 
-<file path=ppt/slides/slide37.xml><?xml version="1.0" encoding="utf-8"?>
+<file path=ppt/slides/slide36.xml><?xml version="1.0" encoding="utf-8"?>
 <p:sld xmlns:a="http://schemas.openxmlformats.org/drawingml/2006/main" xmlns:r="http://schemas.openxmlformats.org/officeDocument/2006/relationships" xmlns:p="http://schemas.openxmlformats.org/presentationml/2006/main">
   <p:cSld>
     <p:spTree>
@@ -35789,7 +34752,7 @@
                 <a:tabLst/>
                 <a:defRPr/>
               </a:pPr>
-              <a:t>37</a:t>
+              <a:t>36</a:t>
             </a:fld>
             <a:endParaRPr kumimoji="0" lang="en-US" sz="1200" b="0" i="0" u="none" strike="noStrike" kern="1200" cap="none" spc="0" normalizeH="0" baseline="0" noProof="0">
               <a:ln>
@@ -37002,7 +35965,7 @@
 </p:sld>
 </file>
 
-<file path=ppt/slides/slide38.xml><?xml version="1.0" encoding="utf-8"?>
+<file path=ppt/slides/slide37.xml><?xml version="1.0" encoding="utf-8"?>
 <p:sld xmlns:a="http://schemas.openxmlformats.org/drawingml/2006/main" xmlns:r="http://schemas.openxmlformats.org/officeDocument/2006/relationships" xmlns:p="http://schemas.openxmlformats.org/presentationml/2006/main">
   <p:cSld>
     <p:spTree>
@@ -37141,7 +36104,7 @@
           <a:p>
             <a:fld id="{20F37917-FD3A-4669-9018-DA04BCDD3D75}" type="slidenum">
               <a:rPr lang="en-US" smtClean="0"/>
-              <a:t>38</a:t>
+              <a:t>37</a:t>
             </a:fld>
             <a:endParaRPr lang="en-US"/>
           </a:p>
@@ -39331,7 +38294,7 @@
           <a:p>
             <a:pPr algn="l"/>
             <a:r>
-              <a:rPr lang="en-US" sz="3600" dirty="0">
+              <a:rPr lang="en-US" sz="3200" dirty="0">
                 <a:solidFill>
                   <a:schemeClr val="tx1"/>
                 </a:solidFill>

</xml_diff>